<commit_message>
1. Progress on Game Scene including player monkey, bowling balls, HUD, and money bag goodness
</commit_message>
<xml_diff>
--- a/MonkeyPinAssets.pptx
+++ b/MonkeyPinAssets.pptx
@@ -6,8 +6,11 @@
   </p:sldMasterIdLst>
   <p:sldIdLst>
     <p:sldId id="256" r:id="rId2"/>
-    <p:sldId id="257" r:id="rId3"/>
-    <p:sldId id="258" r:id="rId4"/>
+    <p:sldId id="259" r:id="rId3"/>
+    <p:sldId id="257" r:id="rId4"/>
+    <p:sldId id="258" r:id="rId5"/>
+    <p:sldId id="260" r:id="rId6"/>
+    <p:sldId id="261" r:id="rId7"/>
   </p:sldIdLst>
   <p:sldSz cx="9144000" cy="6858000" type="screen4x3"/>
   <p:notesSz cx="6858000" cy="9144000"/>
@@ -290,7 +293,7 @@
           <a:p>
             <a:fld id="{A44E3649-04A0-0543-90D7-825C383E7404}" type="datetimeFigureOut">
               <a:rPr lang="en-US" smtClean="0"/>
-              <a:t>3/19/16</a:t>
+              <a:t>4/3/16</a:t>
             </a:fld>
             <a:endParaRPr lang="en-US"/>
           </a:p>
@@ -460,7 +463,7 @@
           <a:p>
             <a:fld id="{A44E3649-04A0-0543-90D7-825C383E7404}" type="datetimeFigureOut">
               <a:rPr lang="en-US" smtClean="0"/>
-              <a:t>3/19/16</a:t>
+              <a:t>4/3/16</a:t>
             </a:fld>
             <a:endParaRPr lang="en-US"/>
           </a:p>
@@ -640,7 +643,7 @@
           <a:p>
             <a:fld id="{A44E3649-04A0-0543-90D7-825C383E7404}" type="datetimeFigureOut">
               <a:rPr lang="en-US" smtClean="0"/>
-              <a:t>3/19/16</a:t>
+              <a:t>4/3/16</a:t>
             </a:fld>
             <a:endParaRPr lang="en-US"/>
           </a:p>
@@ -810,7 +813,7 @@
           <a:p>
             <a:fld id="{A44E3649-04A0-0543-90D7-825C383E7404}" type="datetimeFigureOut">
               <a:rPr lang="en-US" smtClean="0"/>
-              <a:t>3/19/16</a:t>
+              <a:t>4/3/16</a:t>
             </a:fld>
             <a:endParaRPr lang="en-US"/>
           </a:p>
@@ -1056,7 +1059,7 @@
           <a:p>
             <a:fld id="{A44E3649-04A0-0543-90D7-825C383E7404}" type="datetimeFigureOut">
               <a:rPr lang="en-US" smtClean="0"/>
-              <a:t>3/19/16</a:t>
+              <a:t>4/3/16</a:t>
             </a:fld>
             <a:endParaRPr lang="en-US"/>
           </a:p>
@@ -1344,7 +1347,7 @@
           <a:p>
             <a:fld id="{A44E3649-04A0-0543-90D7-825C383E7404}" type="datetimeFigureOut">
               <a:rPr lang="en-US" smtClean="0"/>
-              <a:t>3/19/16</a:t>
+              <a:t>4/3/16</a:t>
             </a:fld>
             <a:endParaRPr lang="en-US"/>
           </a:p>
@@ -1766,7 +1769,7 @@
           <a:p>
             <a:fld id="{A44E3649-04A0-0543-90D7-825C383E7404}" type="datetimeFigureOut">
               <a:rPr lang="en-US" smtClean="0"/>
-              <a:t>3/19/16</a:t>
+              <a:t>4/3/16</a:t>
             </a:fld>
             <a:endParaRPr lang="en-US"/>
           </a:p>
@@ -1884,7 +1887,7 @@
           <a:p>
             <a:fld id="{A44E3649-04A0-0543-90D7-825C383E7404}" type="datetimeFigureOut">
               <a:rPr lang="en-US" smtClean="0"/>
-              <a:t>3/19/16</a:t>
+              <a:t>4/3/16</a:t>
             </a:fld>
             <a:endParaRPr lang="en-US"/>
           </a:p>
@@ -1979,7 +1982,7 @@
           <a:p>
             <a:fld id="{A44E3649-04A0-0543-90D7-825C383E7404}" type="datetimeFigureOut">
               <a:rPr lang="en-US" smtClean="0"/>
-              <a:t>3/19/16</a:t>
+              <a:t>4/3/16</a:t>
             </a:fld>
             <a:endParaRPr lang="en-US"/>
           </a:p>
@@ -2256,7 +2259,7 @@
           <a:p>
             <a:fld id="{A44E3649-04A0-0543-90D7-825C383E7404}" type="datetimeFigureOut">
               <a:rPr lang="en-US" smtClean="0"/>
-              <a:t>3/19/16</a:t>
+              <a:t>4/3/16</a:t>
             </a:fld>
             <a:endParaRPr lang="en-US"/>
           </a:p>
@@ -2509,7 +2512,7 @@
           <a:p>
             <a:fld id="{A44E3649-04A0-0543-90D7-825C383E7404}" type="datetimeFigureOut">
               <a:rPr lang="en-US" smtClean="0"/>
-              <a:t>3/19/16</a:t>
+              <a:t>4/3/16</a:t>
             </a:fld>
             <a:endParaRPr lang="en-US"/>
           </a:p>
@@ -2722,7 +2725,7 @@
           <a:p>
             <a:fld id="{A44E3649-04A0-0543-90D7-825C383E7404}" type="datetimeFigureOut">
               <a:rPr lang="en-US" smtClean="0"/>
-              <a:t>3/19/16</a:t>
+              <a:t>4/3/16</a:t>
             </a:fld>
             <a:endParaRPr lang="en-US"/>
           </a:p>
@@ -3530,6 +3533,439 @@
           <a:chExt cx="0" cy="0"/>
         </a:xfrm>
       </p:grpSpPr>
+      <p:grpSp>
+        <p:nvGrpSpPr>
+          <p:cNvPr id="4" name="Group 3"/>
+          <p:cNvGrpSpPr/>
+          <p:nvPr/>
+        </p:nvGrpSpPr>
+        <p:grpSpPr>
+          <a:xfrm>
+            <a:off x="2004478" y="1057271"/>
+            <a:ext cx="3659112" cy="1133867"/>
+            <a:chOff x="2721655" y="2102928"/>
+            <a:chExt cx="3659112" cy="1133867"/>
+          </a:xfrm>
+        </p:grpSpPr>
+        <p:sp>
+          <p:nvSpPr>
+            <p:cNvPr id="5" name="Rounded Rectangle 4"/>
+            <p:cNvSpPr/>
+            <p:nvPr/>
+          </p:nvSpPr>
+          <p:spPr>
+            <a:xfrm>
+              <a:off x="2721655" y="2102928"/>
+              <a:ext cx="3659112" cy="1133867"/>
+            </a:xfrm>
+            <a:prstGeom prst="roundRect">
+              <a:avLst>
+                <a:gd name="adj" fmla="val 13996"/>
+              </a:avLst>
+            </a:prstGeom>
+            <a:solidFill>
+              <a:srgbClr val="114A0E"/>
+            </a:solidFill>
+            <a:ln>
+              <a:noFill/>
+            </a:ln>
+          </p:spPr>
+          <p:style>
+            <a:lnRef idx="1">
+              <a:schemeClr val="accent1"/>
+            </a:lnRef>
+            <a:fillRef idx="3">
+              <a:schemeClr val="accent1"/>
+            </a:fillRef>
+            <a:effectRef idx="2">
+              <a:schemeClr val="accent1"/>
+            </a:effectRef>
+            <a:fontRef idx="minor">
+              <a:schemeClr val="lt1"/>
+            </a:fontRef>
+          </p:style>
+          <p:txBody>
+            <a:bodyPr rtlCol="0" anchor="ctr"/>
+            <a:lstStyle/>
+            <a:p>
+              <a:pPr algn="ctr"/>
+              <a:endParaRPr lang="en-US"/>
+            </a:p>
+          </p:txBody>
+        </p:sp>
+        <p:sp>
+          <p:nvSpPr>
+            <p:cNvPr id="6" name="TextBox 5"/>
+            <p:cNvSpPr txBox="1"/>
+            <p:nvPr/>
+          </p:nvSpPr>
+          <p:spPr>
+            <a:xfrm>
+              <a:off x="2993821" y="2208196"/>
+              <a:ext cx="3114781" cy="923330"/>
+            </a:xfrm>
+            <a:prstGeom prst="rect">
+              <a:avLst/>
+            </a:prstGeom>
+            <a:solidFill>
+              <a:srgbClr val="114A0E"/>
+            </a:solidFill>
+            <a:ln>
+              <a:noFill/>
+            </a:ln>
+          </p:spPr>
+          <p:txBody>
+            <a:bodyPr wrap="square" rtlCol="0">
+              <a:spAutoFit/>
+            </a:bodyPr>
+            <a:lstStyle/>
+            <a:p>
+              <a:pPr algn="ctr"/>
+              <a:r>
+                <a:rPr lang="en-US" sz="5400" dirty="0" smtClean="0">
+                  <a:ln w="18415" cmpd="sng">
+                    <a:solidFill>
+                      <a:srgbClr val="FFFFFF"/>
+                    </a:solidFill>
+                    <a:prstDash val="solid"/>
+                  </a:ln>
+                  <a:solidFill>
+                    <a:srgbClr val="FFFFFF"/>
+                  </a:solidFill>
+                  <a:effectLst>
+                    <a:outerShdw blurRad="63500" dir="3600000" algn="tl" rotWithShape="0">
+                      <a:srgbClr val="000000">
+                        <a:alpha val="70000"/>
+                      </a:srgbClr>
+                    </a:outerShdw>
+                  </a:effectLst>
+                  <a:latin typeface="Chalkboard"/>
+                </a:rPr>
+                <a:t>Play </a:t>
+              </a:r>
+              <a:r>
+                <a:rPr lang="en-US" sz="5400" dirty="0" smtClean="0"/>
+                <a:t>🍌</a:t>
+              </a:r>
+              <a:endParaRPr lang="en-US" sz="5400" dirty="0">
+                <a:ln w="18415" cmpd="sng">
+                  <a:solidFill>
+                    <a:srgbClr val="FFFFFF"/>
+                  </a:solidFill>
+                  <a:prstDash val="solid"/>
+                </a:ln>
+                <a:solidFill>
+                  <a:srgbClr val="FFFFFF"/>
+                </a:solidFill>
+                <a:effectLst>
+                  <a:outerShdw blurRad="63500" dir="3600000" algn="tl" rotWithShape="0">
+                    <a:srgbClr val="000000">
+                      <a:alpha val="70000"/>
+                    </a:srgbClr>
+                  </a:outerShdw>
+                </a:effectLst>
+                <a:latin typeface="Chalkboard"/>
+              </a:endParaRPr>
+            </a:p>
+          </p:txBody>
+        </p:sp>
+      </p:grpSp>
+      <p:grpSp>
+        <p:nvGrpSpPr>
+          <p:cNvPr id="7" name="Group 6"/>
+          <p:cNvGrpSpPr/>
+          <p:nvPr/>
+        </p:nvGrpSpPr>
+        <p:grpSpPr>
+          <a:xfrm>
+            <a:off x="2004478" y="2572809"/>
+            <a:ext cx="3659112" cy="1133867"/>
+            <a:chOff x="2721655" y="2102928"/>
+            <a:chExt cx="3659112" cy="1133867"/>
+          </a:xfrm>
+        </p:grpSpPr>
+        <p:sp>
+          <p:nvSpPr>
+            <p:cNvPr id="8" name="Rounded Rectangle 7"/>
+            <p:cNvSpPr/>
+            <p:nvPr/>
+          </p:nvSpPr>
+          <p:spPr>
+            <a:xfrm>
+              <a:off x="2721655" y="2102928"/>
+              <a:ext cx="3659112" cy="1133867"/>
+            </a:xfrm>
+            <a:prstGeom prst="roundRect">
+              <a:avLst>
+                <a:gd name="adj" fmla="val 13996"/>
+              </a:avLst>
+            </a:prstGeom>
+            <a:solidFill>
+              <a:srgbClr val="114A0E"/>
+            </a:solidFill>
+            <a:ln>
+              <a:noFill/>
+            </a:ln>
+          </p:spPr>
+          <p:style>
+            <a:lnRef idx="1">
+              <a:schemeClr val="accent1"/>
+            </a:lnRef>
+            <a:fillRef idx="3">
+              <a:schemeClr val="accent1"/>
+            </a:fillRef>
+            <a:effectRef idx="2">
+              <a:schemeClr val="accent1"/>
+            </a:effectRef>
+            <a:fontRef idx="minor">
+              <a:schemeClr val="lt1"/>
+            </a:fontRef>
+          </p:style>
+          <p:txBody>
+            <a:bodyPr rtlCol="0" anchor="ctr"/>
+            <a:lstStyle/>
+            <a:p>
+              <a:pPr algn="ctr"/>
+              <a:endParaRPr lang="en-US"/>
+            </a:p>
+          </p:txBody>
+        </p:sp>
+        <p:sp>
+          <p:nvSpPr>
+            <p:cNvPr id="9" name="TextBox 8"/>
+            <p:cNvSpPr txBox="1"/>
+            <p:nvPr/>
+          </p:nvSpPr>
+          <p:spPr>
+            <a:xfrm>
+              <a:off x="2993821" y="2208196"/>
+              <a:ext cx="3114781" cy="923330"/>
+            </a:xfrm>
+            <a:prstGeom prst="rect">
+              <a:avLst/>
+            </a:prstGeom>
+            <a:solidFill>
+              <a:srgbClr val="114A0E"/>
+            </a:solidFill>
+            <a:ln>
+              <a:noFill/>
+            </a:ln>
+          </p:spPr>
+          <p:txBody>
+            <a:bodyPr wrap="square" rtlCol="0">
+              <a:spAutoFit/>
+            </a:bodyPr>
+            <a:lstStyle/>
+            <a:p>
+              <a:pPr algn="ctr"/>
+              <a:r>
+                <a:rPr lang="en-US" sz="5400" dirty="0" smtClean="0">
+                  <a:ln w="18415" cmpd="sng">
+                    <a:solidFill>
+                      <a:srgbClr val="FFFFFF"/>
+                    </a:solidFill>
+                    <a:prstDash val="solid"/>
+                  </a:ln>
+                  <a:solidFill>
+                    <a:srgbClr val="FFFFFF"/>
+                  </a:solidFill>
+                  <a:effectLst>
+                    <a:outerShdw blurRad="63500" dir="3600000" algn="tl" rotWithShape="0">
+                      <a:srgbClr val="000000">
+                        <a:alpha val="70000"/>
+                      </a:srgbClr>
+                    </a:outerShdw>
+                  </a:effectLst>
+                  <a:latin typeface="Chalkboard"/>
+                </a:rPr>
+                <a:t>Scores</a:t>
+              </a:r>
+              <a:endParaRPr lang="en-US" sz="5400" dirty="0">
+                <a:ln w="18415" cmpd="sng">
+                  <a:solidFill>
+                    <a:srgbClr val="FFFFFF"/>
+                  </a:solidFill>
+                  <a:prstDash val="solid"/>
+                </a:ln>
+                <a:solidFill>
+                  <a:srgbClr val="FFFFFF"/>
+                </a:solidFill>
+                <a:effectLst>
+                  <a:outerShdw blurRad="63500" dir="3600000" algn="tl" rotWithShape="0">
+                    <a:srgbClr val="000000">
+                      <a:alpha val="70000"/>
+                    </a:srgbClr>
+                  </a:outerShdw>
+                </a:effectLst>
+                <a:latin typeface="Chalkboard"/>
+              </a:endParaRPr>
+            </a:p>
+          </p:txBody>
+        </p:sp>
+      </p:grpSp>
+      <p:grpSp>
+        <p:nvGrpSpPr>
+          <p:cNvPr id="10" name="Group 9"/>
+          <p:cNvGrpSpPr/>
+          <p:nvPr/>
+        </p:nvGrpSpPr>
+        <p:grpSpPr>
+          <a:xfrm>
+            <a:off x="2721655" y="3978244"/>
+            <a:ext cx="3659112" cy="1133867"/>
+            <a:chOff x="2721655" y="2102928"/>
+            <a:chExt cx="3659112" cy="1133867"/>
+          </a:xfrm>
+        </p:grpSpPr>
+        <p:sp>
+          <p:nvSpPr>
+            <p:cNvPr id="11" name="Rounded Rectangle 10"/>
+            <p:cNvSpPr/>
+            <p:nvPr/>
+          </p:nvSpPr>
+          <p:spPr>
+            <a:xfrm>
+              <a:off x="2721655" y="2102928"/>
+              <a:ext cx="3659112" cy="1133867"/>
+            </a:xfrm>
+            <a:prstGeom prst="roundRect">
+              <a:avLst>
+                <a:gd name="adj" fmla="val 13996"/>
+              </a:avLst>
+            </a:prstGeom>
+            <a:solidFill>
+              <a:srgbClr val="114A0E"/>
+            </a:solidFill>
+            <a:ln>
+              <a:noFill/>
+            </a:ln>
+          </p:spPr>
+          <p:style>
+            <a:lnRef idx="1">
+              <a:schemeClr val="accent1"/>
+            </a:lnRef>
+            <a:fillRef idx="3">
+              <a:schemeClr val="accent1"/>
+            </a:fillRef>
+            <a:effectRef idx="2">
+              <a:schemeClr val="accent1"/>
+            </a:effectRef>
+            <a:fontRef idx="minor">
+              <a:schemeClr val="lt1"/>
+            </a:fontRef>
+          </p:style>
+          <p:txBody>
+            <a:bodyPr rtlCol="0" anchor="ctr"/>
+            <a:lstStyle/>
+            <a:p>
+              <a:pPr algn="ctr"/>
+              <a:endParaRPr lang="en-US"/>
+            </a:p>
+          </p:txBody>
+        </p:sp>
+        <p:sp>
+          <p:nvSpPr>
+            <p:cNvPr id="12" name="TextBox 11"/>
+            <p:cNvSpPr txBox="1"/>
+            <p:nvPr/>
+          </p:nvSpPr>
+          <p:spPr>
+            <a:xfrm>
+              <a:off x="2993821" y="2208196"/>
+              <a:ext cx="3114781" cy="923330"/>
+            </a:xfrm>
+            <a:prstGeom prst="rect">
+              <a:avLst/>
+            </a:prstGeom>
+            <a:solidFill>
+              <a:srgbClr val="114A0E"/>
+            </a:solidFill>
+            <a:ln>
+              <a:noFill/>
+            </a:ln>
+          </p:spPr>
+          <p:txBody>
+            <a:bodyPr wrap="square" rtlCol="0">
+              <a:spAutoFit/>
+            </a:bodyPr>
+            <a:lstStyle/>
+            <a:p>
+              <a:pPr algn="ctr"/>
+              <a:r>
+                <a:rPr lang="en-US" sz="5400" dirty="0" smtClean="0">
+                  <a:ln w="18415" cmpd="sng">
+                    <a:solidFill>
+                      <a:srgbClr val="FFFFFF"/>
+                    </a:solidFill>
+                    <a:prstDash val="solid"/>
+                  </a:ln>
+                  <a:solidFill>
+                    <a:srgbClr val="FFFFFF"/>
+                  </a:solidFill>
+                  <a:effectLst>
+                    <a:outerShdw blurRad="63500" dir="3600000" algn="tl" rotWithShape="0">
+                      <a:srgbClr val="000000">
+                        <a:alpha val="70000"/>
+                      </a:srgbClr>
+                    </a:outerShdw>
+                  </a:effectLst>
+                  <a:latin typeface="Chalkboard"/>
+                </a:rPr>
+                <a:t>Settings</a:t>
+              </a:r>
+              <a:endParaRPr lang="en-US" sz="5400" dirty="0">
+                <a:ln w="18415" cmpd="sng">
+                  <a:solidFill>
+                    <a:srgbClr val="FFFFFF"/>
+                  </a:solidFill>
+                  <a:prstDash val="solid"/>
+                </a:ln>
+                <a:solidFill>
+                  <a:srgbClr val="FFFFFF"/>
+                </a:solidFill>
+                <a:effectLst>
+                  <a:outerShdw blurRad="63500" dir="3600000" algn="tl" rotWithShape="0">
+                    <a:srgbClr val="000000">
+                      <a:alpha val="70000"/>
+                    </a:srgbClr>
+                  </a:outerShdw>
+                </a:effectLst>
+                <a:latin typeface="Chalkboard"/>
+              </a:endParaRPr>
+            </a:p>
+          </p:txBody>
+        </p:sp>
+      </p:grpSp>
+    </p:spTree>
+    <p:extLst>
+      <p:ext uri="{BB962C8B-B14F-4D97-AF65-F5344CB8AC3E}">
+        <p14:creationId xmlns:p14="http://schemas.microsoft.com/office/powerpoint/2010/main" val="3052503013"/>
+      </p:ext>
+    </p:extLst>
+  </p:cSld>
+  <p:clrMapOvr>
+    <a:masterClrMapping/>
+  </p:clrMapOvr>
+</p:sld>
+</file>
+
+<file path=ppt/slides/slide3.xml><?xml version="1.0" encoding="utf-8"?>
+<p:sld xmlns:a="http://schemas.openxmlformats.org/drawingml/2006/main" xmlns:r="http://schemas.openxmlformats.org/officeDocument/2006/relationships" xmlns:p="http://schemas.openxmlformats.org/presentationml/2006/main">
+  <p:cSld>
+    <p:spTree>
+      <p:nvGrpSpPr>
+        <p:cNvPr id="1" name=""/>
+        <p:cNvGrpSpPr/>
+        <p:nvPr/>
+      </p:nvGrpSpPr>
+      <p:grpSpPr>
+        <a:xfrm>
+          <a:off x="0" y="0"/>
+          <a:ext cx="0" cy="0"/>
+          <a:chOff x="0" y="0"/>
+          <a:chExt cx="0" cy="0"/>
+        </a:xfrm>
+      </p:grpSpPr>
       <p:pic>
         <p:nvPicPr>
           <p:cNvPr id="5" name="Picture 4" descr="monkey_walk_1.png"/>
@@ -3573,7 +4009,7 @@
 </p:sld>
 </file>
 
-<file path=ppt/slides/slide3.xml><?xml version="1.0" encoding="utf-8"?>
+<file path=ppt/slides/slide4.xml><?xml version="1.0" encoding="utf-8"?>
 <p:sld xmlns:a="http://schemas.openxmlformats.org/drawingml/2006/main" xmlns:r="http://schemas.openxmlformats.org/officeDocument/2006/relationships" xmlns:p="http://schemas.openxmlformats.org/presentationml/2006/main">
   <p:cSld>
     <p:spTree>
@@ -3621,33 +4057,70 @@
           </a:p>
         </p:txBody>
       </p:sp>
-      <p:sp>
-        <p:nvSpPr>
-          <p:cNvPr id="7" name="Rectangle 6"/>
-          <p:cNvSpPr/>
+      <p:grpSp>
+        <p:nvGrpSpPr>
+          <p:cNvPr id="2" name="Group 1"/>
+          <p:cNvGrpSpPr/>
           <p:nvPr/>
-        </p:nvSpPr>
-        <p:spPr>
+        </p:nvGrpSpPr>
+        <p:grpSpPr>
           <a:xfrm>
             <a:off x="819854" y="2132370"/>
             <a:ext cx="6983468" cy="3631763"/>
+            <a:chOff x="819854" y="2132370"/>
+            <a:chExt cx="6983468" cy="3631763"/>
           </a:xfrm>
-          <a:prstGeom prst="rect">
-            <a:avLst/>
-          </a:prstGeom>
-          <a:solidFill>
-            <a:srgbClr val="493829"/>
-          </a:solidFill>
-        </p:spPr>
-        <p:txBody>
-          <a:bodyPr wrap="square" lIns="91440" tIns="45720" rIns="91440" bIns="45720">
-            <a:spAutoFit/>
-          </a:bodyPr>
-          <a:lstStyle/>
-          <a:p>
-            <a:pPr algn="ctr"/>
-            <a:r>
-              <a:rPr lang="en-US" sz="11500" b="1" cap="none" spc="0" dirty="0" smtClean="0">
+        </p:grpSpPr>
+        <p:sp>
+          <p:nvSpPr>
+            <p:cNvPr id="7" name="Rectangle 6"/>
+            <p:cNvSpPr/>
+            <p:nvPr/>
+          </p:nvSpPr>
+          <p:spPr>
+            <a:xfrm>
+              <a:off x="819854" y="2132370"/>
+              <a:ext cx="6983468" cy="3631763"/>
+            </a:xfrm>
+            <a:prstGeom prst="rect">
+              <a:avLst/>
+            </a:prstGeom>
+            <a:solidFill>
+              <a:srgbClr val="493829">
+                <a:alpha val="0"/>
+              </a:srgbClr>
+            </a:solidFill>
+          </p:spPr>
+          <p:txBody>
+            <a:bodyPr wrap="square" lIns="91440" tIns="45720" rIns="91440" bIns="45720">
+              <a:spAutoFit/>
+            </a:bodyPr>
+            <a:lstStyle/>
+            <a:p>
+              <a:pPr algn="ctr"/>
+              <a:r>
+                <a:rPr lang="en-US" sz="11500" b="1" cap="none" spc="0" dirty="0" smtClean="0">
+                  <a:ln w="12700">
+                    <a:solidFill>
+                      <a:schemeClr val="tx1"/>
+                    </a:solidFill>
+                    <a:prstDash val="solid"/>
+                  </a:ln>
+                  <a:solidFill>
+                    <a:srgbClr val="85570A"/>
+                  </a:solidFill>
+                  <a:effectLst>
+                    <a:outerShdw blurRad="41275" dist="20320" dir="1800000" algn="tl" rotWithShape="0">
+                      <a:srgbClr val="000000">
+                        <a:alpha val="40000"/>
+                      </a:srgbClr>
+                    </a:outerShdw>
+                  </a:effectLst>
+                  <a:latin typeface="Chalkboard"/>
+                </a:rPr>
+                <a:t>Monkey Pin</a:t>
+              </a:r>
+              <a:endParaRPr lang="en-US" sz="11500" b="1" cap="none" spc="0" dirty="0">
                 <a:ln w="12700">
                   <a:solidFill>
                     <a:schemeClr val="tx1"/>
@@ -3665,34 +4138,169 @@
                   </a:outerShdw>
                 </a:effectLst>
                 <a:latin typeface="Chalkboard"/>
-              </a:rPr>
-              <a:t>Monkey Pin</a:t>
-            </a:r>
-            <a:endParaRPr lang="en-US" sz="11500" b="1" cap="none" spc="0" dirty="0">
-              <a:ln w="12700">
-                <a:solidFill>
-                  <a:schemeClr val="tx1"/>
-                </a:solidFill>
-                <a:prstDash val="solid"/>
-              </a:ln>
-              <a:solidFill>
-                <a:srgbClr val="85570A"/>
-              </a:solidFill>
-              <a:effectLst>
-                <a:outerShdw blurRad="41275" dist="20320" dir="1800000" algn="tl" rotWithShape="0">
-                  <a:srgbClr val="000000">
-                    <a:alpha val="40000"/>
-                  </a:srgbClr>
-                </a:outerShdw>
-              </a:effectLst>
-              <a:latin typeface="Chalkboard"/>
-            </a:endParaRPr>
+              </a:endParaRPr>
+            </a:p>
+          </p:txBody>
+        </p:sp>
+        <p:pic>
+          <p:nvPicPr>
+            <p:cNvPr id="8" name="Picture 7" descr="monkey_head_400x400.png"/>
+            <p:cNvPicPr>
+              <a:picLocks noChangeAspect="1"/>
+            </p:cNvPicPr>
+            <p:nvPr/>
+          </p:nvPicPr>
+          <p:blipFill>
+            <a:blip r:embed="rId2">
+              <a:extLst>
+                <a:ext uri="{28A0092B-C50C-407E-A947-70E740481C1C}">
+                  <a14:useLocalDpi xmlns:a14="http://schemas.microsoft.com/office/drawing/2010/main" val="0"/>
+                </a:ext>
+              </a:extLst>
+            </a:blip>
+            <a:stretch>
+              <a:fillRect/>
+            </a:stretch>
+          </p:blipFill>
+          <p:spPr>
+            <a:xfrm>
+              <a:off x="2818903" y="2710526"/>
+              <a:ext cx="1125021" cy="1125021"/>
+            </a:xfrm>
+            <a:prstGeom prst="rect">
+              <a:avLst/>
+            </a:prstGeom>
+          </p:spPr>
+        </p:pic>
+        <p:pic>
+          <p:nvPicPr>
+            <p:cNvPr id="4" name="Picture 3" descr="bp.png"/>
+            <p:cNvPicPr>
+              <a:picLocks noChangeAspect="1"/>
+            </p:cNvPicPr>
+            <p:nvPr/>
+          </p:nvPicPr>
+          <p:blipFill>
+            <a:blip r:embed="rId3">
+              <a:extLst>
+                <a:ext uri="{28A0092B-C50C-407E-A947-70E740481C1C}">
+                  <a14:useLocalDpi xmlns:a14="http://schemas.microsoft.com/office/drawing/2010/main" val="0"/>
+                </a:ext>
+              </a:extLst>
+            </a:blip>
+            <a:stretch>
+              <a:fillRect/>
+            </a:stretch>
+          </p:blipFill>
+          <p:spPr>
+            <a:xfrm rot="19944180" flipH="1">
+              <a:off x="5182587" y="3893011"/>
+              <a:ext cx="557143" cy="1694731"/>
+            </a:xfrm>
+            <a:prstGeom prst="rect">
+              <a:avLst/>
+            </a:prstGeom>
+            <a:scene3d>
+              <a:camera prst="orthographicFront">
+                <a:rot lat="0" lon="0" rev="0"/>
+              </a:camera>
+              <a:lightRig rig="threePt" dir="t"/>
+            </a:scene3d>
+          </p:spPr>
+        </p:pic>
+      </p:grpSp>
+    </p:spTree>
+    <p:extLst>
+      <p:ext uri="{BB962C8B-B14F-4D97-AF65-F5344CB8AC3E}">
+        <p14:creationId xmlns:p14="http://schemas.microsoft.com/office/powerpoint/2010/main" val="2435443644"/>
+      </p:ext>
+    </p:extLst>
+  </p:cSld>
+  <p:clrMapOvr>
+    <a:masterClrMapping/>
+  </p:clrMapOvr>
+</p:sld>
+</file>
+
+<file path=ppt/slides/slide5.xml><?xml version="1.0" encoding="utf-8"?>
+<p:sld xmlns:a="http://schemas.openxmlformats.org/drawingml/2006/main" xmlns:r="http://schemas.openxmlformats.org/officeDocument/2006/relationships" xmlns:p="http://schemas.openxmlformats.org/presentationml/2006/main">
+  <p:cSld>
+    <p:spTree>
+      <p:nvGrpSpPr>
+        <p:cNvPr id="1" name=""/>
+        <p:cNvGrpSpPr/>
+        <p:nvPr/>
+      </p:nvGrpSpPr>
+      <p:grpSpPr>
+        <a:xfrm>
+          <a:off x="0" y="0"/>
+          <a:ext cx="0" cy="0"/>
+          <a:chOff x="0" y="0"/>
+          <a:chExt cx="0" cy="0"/>
+        </a:xfrm>
+      </p:grpSpPr>
+      <p:sp>
+        <p:nvSpPr>
+          <p:cNvPr id="4" name="Rectangle 3"/>
+          <p:cNvSpPr/>
+          <p:nvPr/>
+        </p:nvSpPr>
+        <p:spPr>
+          <a:xfrm>
+            <a:off x="2404127" y="1904894"/>
+            <a:ext cx="2948458" cy="369332"/>
+          </a:xfrm>
+          <a:prstGeom prst="rect">
+            <a:avLst/>
+          </a:prstGeom>
+        </p:spPr>
+        <p:txBody>
+          <a:bodyPr wrap="square">
+            <a:spAutoFit/>
+          </a:bodyPr>
+          <a:lstStyle/>
+          <a:p>
+            <a:r>
+              <a:rPr lang="en-US" dirty="0"/>
+              <a:t>🎳</a:t>
+            </a:r>
+            <a:endParaRPr lang="en-US" dirty="0"/>
+          </a:p>
+        </p:txBody>
+      </p:sp>
+      <p:sp>
+        <p:nvSpPr>
+          <p:cNvPr id="7" name="TextBox 6"/>
+          <p:cNvSpPr txBox="1"/>
+          <p:nvPr/>
+        </p:nvSpPr>
+        <p:spPr>
+          <a:xfrm>
+            <a:off x="1769075" y="2274226"/>
+            <a:ext cx="2570449" cy="2646878"/>
+          </a:xfrm>
+          <a:prstGeom prst="rect">
+            <a:avLst/>
+          </a:prstGeom>
+          <a:noFill/>
+        </p:spPr>
+        <p:txBody>
+          <a:bodyPr wrap="square" rtlCol="0">
+            <a:spAutoFit/>
+          </a:bodyPr>
+          <a:lstStyle/>
+          <a:p>
+            <a:r>
+              <a:rPr lang="en-US" sz="16600" dirty="0"/>
+              <a:t>🎳</a:t>
+            </a:r>
+            <a:endParaRPr lang="en-US" sz="16600" dirty="0"/>
           </a:p>
         </p:txBody>
       </p:sp>
       <p:pic>
         <p:nvPicPr>
-          <p:cNvPr id="8" name="Picture 7" descr="monkey_head_400x400.png"/>
+          <p:cNvPr id="8" name="Picture 7" descr="bowling_emoji.png"/>
           <p:cNvPicPr>
             <a:picLocks noChangeAspect="1"/>
           </p:cNvPicPr>
@@ -3712,54 +4320,78 @@
         </p:blipFill>
         <p:spPr>
           <a:xfrm>
-            <a:off x="2818903" y="2710526"/>
-            <a:ext cx="1125021" cy="1125021"/>
+            <a:off x="5502757" y="1664553"/>
+            <a:ext cx="2572512" cy="2840736"/>
           </a:xfrm>
-          <a:prstGeom prst="rect">
+          <a:prstGeom prst="ellipse">
             <a:avLst/>
           </a:prstGeom>
-        </p:spPr>
-      </p:pic>
-      <p:pic>
-        <p:nvPicPr>
-          <p:cNvPr id="4" name="Picture 3" descr="bp.png"/>
-          <p:cNvPicPr>
-            <a:picLocks noChangeAspect="1"/>
-          </p:cNvPicPr>
-          <p:nvPr/>
-        </p:nvPicPr>
-        <p:blipFill>
-          <a:blip r:embed="rId3">
-            <a:extLst>
-              <a:ext uri="{28A0092B-C50C-407E-A947-70E740481C1C}">
-                <a14:useLocalDpi xmlns:a14="http://schemas.microsoft.com/office/drawing/2010/main" val="0"/>
-              </a:ext>
-            </a:extLst>
-          </a:blip>
-          <a:stretch>
-            <a:fillRect/>
-          </a:stretch>
-        </p:blipFill>
-        <p:spPr>
-          <a:xfrm rot="19944180" flipH="1">
-            <a:off x="5182587" y="3893011"/>
-            <a:ext cx="557143" cy="1694731"/>
-          </a:xfrm>
-          <a:prstGeom prst="rect">
-            <a:avLst/>
-          </a:prstGeom>
-          <a:scene3d>
-            <a:camera prst="orthographicFront">
-              <a:rot lat="0" lon="0" rev="0"/>
-            </a:camera>
-            <a:lightRig rig="threePt" dir="t"/>
-          </a:scene3d>
         </p:spPr>
       </p:pic>
     </p:spTree>
     <p:extLst>
       <p:ext uri="{BB962C8B-B14F-4D97-AF65-F5344CB8AC3E}">
-        <p14:creationId xmlns:p14="http://schemas.microsoft.com/office/powerpoint/2010/main" val="2435443644"/>
+        <p14:creationId xmlns:p14="http://schemas.microsoft.com/office/powerpoint/2010/main" val="3897380794"/>
+      </p:ext>
+    </p:extLst>
+  </p:cSld>
+  <p:clrMapOvr>
+    <a:masterClrMapping/>
+  </p:clrMapOvr>
+</p:sld>
+</file>
+
+<file path=ppt/slides/slide6.xml><?xml version="1.0" encoding="utf-8"?>
+<p:sld xmlns:a="http://schemas.openxmlformats.org/drawingml/2006/main" xmlns:r="http://schemas.openxmlformats.org/officeDocument/2006/relationships" xmlns:p="http://schemas.openxmlformats.org/presentationml/2006/main">
+  <p:cSld>
+    <p:spTree>
+      <p:nvGrpSpPr>
+        <p:cNvPr id="1" name=""/>
+        <p:cNvGrpSpPr/>
+        <p:nvPr/>
+      </p:nvGrpSpPr>
+      <p:grpSpPr>
+        <a:xfrm>
+          <a:off x="0" y="0"/>
+          <a:ext cx="0" cy="0"/>
+          <a:chOff x="0" y="0"/>
+          <a:chExt cx="0" cy="0"/>
+        </a:xfrm>
+      </p:grpSpPr>
+      <p:sp>
+        <p:nvSpPr>
+          <p:cNvPr id="6" name="TextBox 5"/>
+          <p:cNvSpPr txBox="1"/>
+          <p:nvPr/>
+        </p:nvSpPr>
+        <p:spPr>
+          <a:xfrm>
+            <a:off x="1269949" y="1457459"/>
+            <a:ext cx="3001701" cy="3154710"/>
+          </a:xfrm>
+          <a:prstGeom prst="rect">
+            <a:avLst/>
+          </a:prstGeom>
+          <a:noFill/>
+        </p:spPr>
+        <p:txBody>
+          <a:bodyPr wrap="square" rtlCol="0">
+            <a:spAutoFit/>
+          </a:bodyPr>
+          <a:lstStyle/>
+          <a:p>
+            <a:r>
+              <a:rPr lang="en-US" sz="19900" dirty="0"/>
+              <a:t>💰</a:t>
+            </a:r>
+            <a:endParaRPr lang="en-US" sz="19900" dirty="0"/>
+          </a:p>
+        </p:txBody>
+      </p:sp>
+    </p:spTree>
+    <p:extLst>
+      <p:ext uri="{BB962C8B-B14F-4D97-AF65-F5344CB8AC3E}">
+        <p14:creationId xmlns:p14="http://schemas.microsoft.com/office/powerpoint/2010/main" val="2110327322"/>
       </p:ext>
     </p:extLst>
   </p:cSld>

</xml_diff>

<commit_message>
1. Pause state functionality, with quit and resume options during pause state
</commit_message>
<xml_diff>
--- a/MonkeyPinAssets.pptx
+++ b/MonkeyPinAssets.pptx
@@ -11,6 +11,8 @@
     <p:sldId id="258" r:id="rId5"/>
     <p:sldId id="260" r:id="rId6"/>
     <p:sldId id="261" r:id="rId7"/>
+    <p:sldId id="262" r:id="rId8"/>
+    <p:sldId id="263" r:id="rId9"/>
   </p:sldIdLst>
   <p:sldSz cx="9144000" cy="6858000" type="screen4x3"/>
   <p:notesSz cx="6858000" cy="9144000"/>
@@ -109,6 +111,22 @@
       </a:defRPr>
     </a:lvl9pPr>
   </p:defaultTextStyle>
+  <p:extLst>
+    <p:ext uri="{EFAFB233-063F-42B5-8137-9DF3F51BA10A}">
+      <p15:sldGuideLst xmlns:p15="http://schemas.microsoft.com/office/powerpoint/2012/main">
+        <p15:guide id="1" orient="horz" pos="2160">
+          <p15:clr>
+            <a:srgbClr val="A4A3A4"/>
+          </p15:clr>
+        </p15:guide>
+        <p15:guide id="2" pos="2880">
+          <p15:clr>
+            <a:srgbClr val="A4A3A4"/>
+          </p15:clr>
+        </p15:guide>
+      </p15:sldGuideLst>
+    </p:ext>
+  </p:extLst>
 </p:presentation>
 </file>
 
@@ -293,7 +311,7 @@
           <a:p>
             <a:fld id="{A44E3649-04A0-0543-90D7-825C383E7404}" type="datetimeFigureOut">
               <a:rPr lang="en-US" smtClean="0"/>
-              <a:t>4/3/16</a:t>
+              <a:t>4/12/16</a:t>
             </a:fld>
             <a:endParaRPr lang="en-US"/>
           </a:p>
@@ -463,7 +481,7 @@
           <a:p>
             <a:fld id="{A44E3649-04A0-0543-90D7-825C383E7404}" type="datetimeFigureOut">
               <a:rPr lang="en-US" smtClean="0"/>
-              <a:t>4/3/16</a:t>
+              <a:t>4/12/16</a:t>
             </a:fld>
             <a:endParaRPr lang="en-US"/>
           </a:p>
@@ -643,7 +661,7 @@
           <a:p>
             <a:fld id="{A44E3649-04A0-0543-90D7-825C383E7404}" type="datetimeFigureOut">
               <a:rPr lang="en-US" smtClean="0"/>
-              <a:t>4/3/16</a:t>
+              <a:t>4/12/16</a:t>
             </a:fld>
             <a:endParaRPr lang="en-US"/>
           </a:p>
@@ -813,7 +831,7 @@
           <a:p>
             <a:fld id="{A44E3649-04A0-0543-90D7-825C383E7404}" type="datetimeFigureOut">
               <a:rPr lang="en-US" smtClean="0"/>
-              <a:t>4/3/16</a:t>
+              <a:t>4/12/16</a:t>
             </a:fld>
             <a:endParaRPr lang="en-US"/>
           </a:p>
@@ -1059,7 +1077,7 @@
           <a:p>
             <a:fld id="{A44E3649-04A0-0543-90D7-825C383E7404}" type="datetimeFigureOut">
               <a:rPr lang="en-US" smtClean="0"/>
-              <a:t>4/3/16</a:t>
+              <a:t>4/12/16</a:t>
             </a:fld>
             <a:endParaRPr lang="en-US"/>
           </a:p>
@@ -1347,7 +1365,7 @@
           <a:p>
             <a:fld id="{A44E3649-04A0-0543-90D7-825C383E7404}" type="datetimeFigureOut">
               <a:rPr lang="en-US" smtClean="0"/>
-              <a:t>4/3/16</a:t>
+              <a:t>4/12/16</a:t>
             </a:fld>
             <a:endParaRPr lang="en-US"/>
           </a:p>
@@ -1769,7 +1787,7 @@
           <a:p>
             <a:fld id="{A44E3649-04A0-0543-90D7-825C383E7404}" type="datetimeFigureOut">
               <a:rPr lang="en-US" smtClean="0"/>
-              <a:t>4/3/16</a:t>
+              <a:t>4/12/16</a:t>
             </a:fld>
             <a:endParaRPr lang="en-US"/>
           </a:p>
@@ -1887,7 +1905,7 @@
           <a:p>
             <a:fld id="{A44E3649-04A0-0543-90D7-825C383E7404}" type="datetimeFigureOut">
               <a:rPr lang="en-US" smtClean="0"/>
-              <a:t>4/3/16</a:t>
+              <a:t>4/12/16</a:t>
             </a:fld>
             <a:endParaRPr lang="en-US"/>
           </a:p>
@@ -1982,7 +2000,7 @@
           <a:p>
             <a:fld id="{A44E3649-04A0-0543-90D7-825C383E7404}" type="datetimeFigureOut">
               <a:rPr lang="en-US" smtClean="0"/>
-              <a:t>4/3/16</a:t>
+              <a:t>4/12/16</a:t>
             </a:fld>
             <a:endParaRPr lang="en-US"/>
           </a:p>
@@ -2259,7 +2277,7 @@
           <a:p>
             <a:fld id="{A44E3649-04A0-0543-90D7-825C383E7404}" type="datetimeFigureOut">
               <a:rPr lang="en-US" smtClean="0"/>
-              <a:t>4/3/16</a:t>
+              <a:t>4/12/16</a:t>
             </a:fld>
             <a:endParaRPr lang="en-US"/>
           </a:p>
@@ -2512,7 +2530,7 @@
           <a:p>
             <a:fld id="{A44E3649-04A0-0543-90D7-825C383E7404}" type="datetimeFigureOut">
               <a:rPr lang="en-US" smtClean="0"/>
-              <a:t>4/3/16</a:t>
+              <a:t>4/12/16</a:t>
             </a:fld>
             <a:endParaRPr lang="en-US"/>
           </a:p>
@@ -2725,7 +2743,7 @@
           <a:p>
             <a:fld id="{A44E3649-04A0-0543-90D7-825C383E7404}" type="datetimeFigureOut">
               <a:rPr lang="en-US" smtClean="0"/>
-              <a:t>4/3/16</a:t>
+              <a:t>4/12/16</a:t>
             </a:fld>
             <a:endParaRPr lang="en-US"/>
           </a:p>
@@ -4264,7 +4282,6 @@
               <a:rPr lang="en-US" dirty="0"/>
               <a:t>🎳</a:t>
             </a:r>
-            <a:endParaRPr lang="en-US" dirty="0"/>
           </a:p>
         </p:txBody>
       </p:sp>
@@ -4294,7 +4311,6 @@
               <a:rPr lang="en-US" sz="16600" dirty="0"/>
               <a:t>🎳</a:t>
             </a:r>
-            <a:endParaRPr lang="en-US" sz="16600" dirty="0"/>
           </a:p>
         </p:txBody>
       </p:sp>
@@ -4324,6 +4340,133 @@
             <a:ext cx="2572512" cy="2840736"/>
           </a:xfrm>
           <a:prstGeom prst="ellipse">
+            <a:avLst/>
+          </a:prstGeom>
+        </p:spPr>
+      </p:pic>
+      <p:sp>
+        <p:nvSpPr>
+          <p:cNvPr id="2" name="Oval 1"/>
+          <p:cNvSpPr/>
+          <p:nvPr/>
+        </p:nvSpPr>
+        <p:spPr>
+          <a:xfrm>
+            <a:off x="4000077" y="1241472"/>
+            <a:ext cx="1214650" cy="1214650"/>
+          </a:xfrm>
+          <a:prstGeom prst="ellipse">
+            <a:avLst/>
+          </a:prstGeom>
+        </p:spPr>
+        <p:style>
+          <a:lnRef idx="1">
+            <a:schemeClr val="accent1"/>
+          </a:lnRef>
+          <a:fillRef idx="3">
+            <a:schemeClr val="accent1"/>
+          </a:fillRef>
+          <a:effectRef idx="2">
+            <a:schemeClr val="accent1"/>
+          </a:effectRef>
+          <a:fontRef idx="minor">
+            <a:schemeClr val="lt1"/>
+          </a:fontRef>
+        </p:style>
+        <p:txBody>
+          <a:bodyPr rtlCol="0" anchor="ctr"/>
+          <a:lstStyle/>
+          <a:p>
+            <a:pPr algn="ctr"/>
+            <a:endParaRPr lang="en-US"/>
+          </a:p>
+        </p:txBody>
+      </p:sp>
+      <p:pic>
+        <p:nvPicPr>
+          <p:cNvPr id="3" name="Picture 2"/>
+          <p:cNvPicPr>
+            <a:picLocks noChangeAspect="1"/>
+          </p:cNvPicPr>
+          <p:nvPr/>
+        </p:nvPicPr>
+        <p:blipFill>
+          <a:blip r:embed="rId2">
+            <a:extLst>
+              <a:ext uri="{28A0092B-C50C-407E-A947-70E740481C1C}">
+                <a14:useLocalDpi xmlns:a14="http://schemas.microsoft.com/office/drawing/2010/main" val="0"/>
+              </a:ext>
+            </a:extLst>
+          </a:blip>
+          <a:stretch>
+            <a:fillRect/>
+          </a:stretch>
+        </p:blipFill>
+        <p:spPr>
+          <a:xfrm>
+            <a:off x="3569309" y="3321754"/>
+            <a:ext cx="2572512" cy="2840736"/>
+          </a:xfrm>
+          <a:prstGeom prst="rect">
+            <a:avLst/>
+          </a:prstGeom>
+        </p:spPr>
+      </p:pic>
+      <p:pic>
+        <p:nvPicPr>
+          <p:cNvPr id="5" name="Picture 4"/>
+          <p:cNvPicPr>
+            <a:picLocks noChangeAspect="1"/>
+          </p:cNvPicPr>
+          <p:nvPr/>
+        </p:nvPicPr>
+        <p:blipFill>
+          <a:blip r:embed="rId3">
+            <a:extLst>
+              <a:ext uri="{BEBA8EAE-BF5A-486C-A8C5-ECC9F3942E4B}">
+                <a14:imgProps xmlns:a14="http://schemas.microsoft.com/office/drawing/2010/main">
+                  <a14:imgLayer r:embed="rId4">
+                    <a14:imgEffect>
+                      <a14:backgroundRemoval t="0" b="97143" l="1869" r="98131">
+                        <a14:foregroundMark x1="36449" y1="26667" x2="36449" y2="26667"/>
+                        <a14:foregroundMark x1="84112" y1="9524" x2="93925" y2="17143"/>
+                        <a14:foregroundMark x1="79907" y1="7619" x2="62617" y2="2857"/>
+                        <a14:foregroundMark x1="79907" y1="10000" x2="91589" y2="24286"/>
+                        <a14:foregroundMark x1="25701" y1="5714" x2="10280" y2="17143"/>
+                        <a14:foregroundMark x1="11215" y1="80476" x2="28972" y2="95238"/>
+                        <a14:foregroundMark x1="92523" y1="73810" x2="73832" y2="95238"/>
+                        <a14:foregroundMark x1="87383" y1="91429" x2="97196" y2="70476"/>
+                        <a14:foregroundMark x1="85047" y1="96667" x2="17757" y2="99524"/>
+                        <a14:foregroundMark x1="18224" y1="94762" x2="2336" y2="80476"/>
+                        <a14:foregroundMark x1="7944" y1="77143" x2="2336" y2="68571"/>
+                        <a14:foregroundMark x1="3738" y1="14762" x2="13084" y2="2381"/>
+                        <a14:foregroundMark x1="95327" y1="76667" x2="94393" y2="96667"/>
+                        <a14:foregroundMark x1="74299" y1="2381" x2="96262" y2="11905"/>
+                        <a14:foregroundMark x1="96262" y1="7619" x2="82710" y2="3333"/>
+                        <a14:foregroundMark x1="93458" y1="2857" x2="97664" y2="4286"/>
+                        <a14:foregroundMark x1="95327" y1="17619" x2="98598" y2="66667"/>
+                        <a14:foregroundMark x1="4206" y1="17619" x2="1869" y2="45238"/>
+                        <a14:foregroundMark x1="17290" y1="3333" x2="59813" y2="0"/>
+                      </a14:backgroundRemoval>
+                    </a14:imgEffect>
+                  </a14:imgLayer>
+                </a14:imgProps>
+              </a:ext>
+              <a:ext uri="{28A0092B-C50C-407E-A947-70E740481C1C}">
+                <a14:useLocalDpi xmlns:a14="http://schemas.microsoft.com/office/drawing/2010/main" val="0"/>
+              </a:ext>
+            </a:extLst>
+          </a:blip>
+          <a:stretch>
+            <a:fillRect/>
+          </a:stretch>
+        </p:blipFill>
+        <p:spPr>
+          <a:xfrm>
+            <a:off x="17179" y="83339"/>
+            <a:ext cx="2717800" cy="2667000"/>
+          </a:xfrm>
+          <a:prstGeom prst="rect">
             <a:avLst/>
           </a:prstGeom>
         </p:spPr>
@@ -4358,40 +4501,719 @@
           <a:chExt cx="0" cy="0"/>
         </a:xfrm>
       </p:grpSpPr>
-      <p:sp>
-        <p:nvSpPr>
-          <p:cNvPr id="6" name="TextBox 5"/>
-          <p:cNvSpPr txBox="1"/>
+      <p:pic>
+        <p:nvPicPr>
+          <p:cNvPr id="12" name="Picture 11"/>
+          <p:cNvPicPr>
+            <a:picLocks noChangeAspect="1"/>
+          </p:cNvPicPr>
           <p:nvPr/>
-        </p:nvSpPr>
+        </p:nvPicPr>
+        <p:blipFill>
+          <a:blip r:embed="rId2">
+            <a:extLst>
+              <a:ext uri="{28A0092B-C50C-407E-A947-70E740481C1C}">
+                <a14:useLocalDpi xmlns:a14="http://schemas.microsoft.com/office/drawing/2010/main" val="0"/>
+              </a:ext>
+            </a:extLst>
+          </a:blip>
+          <a:stretch>
+            <a:fillRect/>
+          </a:stretch>
+        </p:blipFill>
         <p:spPr>
           <a:xfrm>
-            <a:off x="1269949" y="1457459"/>
-            <a:ext cx="3001701" cy="3154710"/>
+            <a:off x="1192518" y="324875"/>
+            <a:ext cx="2176637" cy="2176637"/>
           </a:xfrm>
           <a:prstGeom prst="rect">
             <a:avLst/>
           </a:prstGeom>
-          <a:noFill/>
         </p:spPr>
-        <p:txBody>
-          <a:bodyPr wrap="square" rtlCol="0">
-            <a:spAutoFit/>
-          </a:bodyPr>
-          <a:lstStyle/>
-          <a:p>
-            <a:r>
-              <a:rPr lang="en-US" sz="19900" dirty="0"/>
-              <a:t>💰</a:t>
-            </a:r>
-            <a:endParaRPr lang="en-US" sz="19900" dirty="0"/>
-          </a:p>
-        </p:txBody>
-      </p:sp>
+      </p:pic>
+      <p:grpSp>
+        <p:nvGrpSpPr>
+          <p:cNvPr id="18" name="Group 17"/>
+          <p:cNvGrpSpPr/>
+          <p:nvPr/>
+        </p:nvGrpSpPr>
+        <p:grpSpPr>
+          <a:xfrm>
+            <a:off x="1719618" y="2388357"/>
+            <a:ext cx="1122438" cy="1428738"/>
+            <a:chOff x="1719618" y="2388357"/>
+            <a:chExt cx="1122438" cy="1428738"/>
+          </a:xfrm>
+        </p:grpSpPr>
+        <p:sp>
+          <p:nvSpPr>
+            <p:cNvPr id="13" name="Rectangle 12"/>
+            <p:cNvSpPr/>
+            <p:nvPr/>
+          </p:nvSpPr>
+          <p:spPr>
+            <a:xfrm>
+              <a:off x="1719618" y="2388357"/>
+              <a:ext cx="409432" cy="1428738"/>
+            </a:xfrm>
+            <a:prstGeom prst="rect">
+              <a:avLst/>
+            </a:prstGeom>
+            <a:solidFill>
+              <a:schemeClr val="bg1"/>
+            </a:solidFill>
+            <a:ln>
+              <a:noFill/>
+            </a:ln>
+          </p:spPr>
+          <p:style>
+            <a:lnRef idx="1">
+              <a:schemeClr val="accent1"/>
+            </a:lnRef>
+            <a:fillRef idx="3">
+              <a:schemeClr val="accent1"/>
+            </a:fillRef>
+            <a:effectRef idx="2">
+              <a:schemeClr val="accent1"/>
+            </a:effectRef>
+            <a:fontRef idx="minor">
+              <a:schemeClr val="lt1"/>
+            </a:fontRef>
+          </p:style>
+          <p:txBody>
+            <a:bodyPr rtlCol="0" anchor="ctr"/>
+            <a:lstStyle/>
+            <a:p>
+              <a:pPr algn="ctr"/>
+              <a:endParaRPr lang="en-US"/>
+            </a:p>
+          </p:txBody>
+        </p:sp>
+        <p:sp>
+          <p:nvSpPr>
+            <p:cNvPr id="15" name="Rectangle 14"/>
+            <p:cNvSpPr/>
+            <p:nvPr/>
+          </p:nvSpPr>
+          <p:spPr>
+            <a:xfrm>
+              <a:off x="2432624" y="2388357"/>
+              <a:ext cx="409432" cy="1428737"/>
+            </a:xfrm>
+            <a:prstGeom prst="rect">
+              <a:avLst/>
+            </a:prstGeom>
+            <a:solidFill>
+              <a:schemeClr val="bg1"/>
+            </a:solidFill>
+            <a:ln>
+              <a:noFill/>
+            </a:ln>
+          </p:spPr>
+          <p:style>
+            <a:lnRef idx="1">
+              <a:schemeClr val="accent1"/>
+            </a:lnRef>
+            <a:fillRef idx="3">
+              <a:schemeClr val="accent1"/>
+            </a:fillRef>
+            <a:effectRef idx="2">
+              <a:schemeClr val="accent1"/>
+            </a:effectRef>
+            <a:fontRef idx="minor">
+              <a:schemeClr val="lt1"/>
+            </a:fontRef>
+          </p:style>
+          <p:txBody>
+            <a:bodyPr rtlCol="0" anchor="ctr"/>
+            <a:lstStyle/>
+            <a:p>
+              <a:pPr algn="ctr"/>
+              <a:endParaRPr lang="en-US"/>
+            </a:p>
+          </p:txBody>
+        </p:sp>
+        <p:sp>
+          <p:nvSpPr>
+            <p:cNvPr id="17" name="Rectangle 16"/>
+            <p:cNvSpPr/>
+            <p:nvPr/>
+          </p:nvSpPr>
+          <p:spPr>
+            <a:xfrm>
+              <a:off x="1719618" y="2388357"/>
+              <a:ext cx="1122438" cy="1428737"/>
+            </a:xfrm>
+            <a:prstGeom prst="rect">
+              <a:avLst/>
+            </a:prstGeom>
+            <a:noFill/>
+            <a:ln>
+              <a:noFill/>
+            </a:ln>
+          </p:spPr>
+          <p:style>
+            <a:lnRef idx="1">
+              <a:schemeClr val="accent1"/>
+            </a:lnRef>
+            <a:fillRef idx="3">
+              <a:schemeClr val="accent1"/>
+            </a:fillRef>
+            <a:effectRef idx="2">
+              <a:schemeClr val="accent1"/>
+            </a:effectRef>
+            <a:fontRef idx="minor">
+              <a:schemeClr val="lt1"/>
+            </a:fontRef>
+          </p:style>
+          <p:txBody>
+            <a:bodyPr rtlCol="0" anchor="ctr"/>
+            <a:lstStyle/>
+            <a:p>
+              <a:pPr algn="ctr"/>
+              <a:endParaRPr lang="en-US"/>
+            </a:p>
+          </p:txBody>
+        </p:sp>
+      </p:grpSp>
+      <p:grpSp>
+        <p:nvGrpSpPr>
+          <p:cNvPr id="20" name="Group 19"/>
+          <p:cNvGrpSpPr/>
+          <p:nvPr/>
+        </p:nvGrpSpPr>
+        <p:grpSpPr>
+          <a:xfrm>
+            <a:off x="4701299" y="507511"/>
+            <a:ext cx="3001701" cy="5981999"/>
+            <a:chOff x="4742242" y="876001"/>
+            <a:chExt cx="3001701" cy="5981999"/>
+          </a:xfrm>
+        </p:grpSpPr>
+        <p:sp>
+          <p:nvSpPr>
+            <p:cNvPr id="6" name="TextBox 5"/>
+            <p:cNvSpPr txBox="1"/>
+            <p:nvPr/>
+          </p:nvSpPr>
+          <p:spPr>
+            <a:xfrm>
+              <a:off x="4803304" y="3703290"/>
+              <a:ext cx="2879578" cy="3154710"/>
+            </a:xfrm>
+            <a:prstGeom prst="rect">
+              <a:avLst/>
+            </a:prstGeom>
+            <a:noFill/>
+          </p:spPr>
+          <p:txBody>
+            <a:bodyPr wrap="square" rtlCol="0">
+              <a:spAutoFit/>
+            </a:bodyPr>
+            <a:lstStyle/>
+            <a:p>
+              <a:r>
+                <a:rPr lang="en-US" sz="19900" dirty="0"/>
+                <a:t>💰</a:t>
+              </a:r>
+            </a:p>
+          </p:txBody>
+        </p:sp>
+        <p:sp>
+          <p:nvSpPr>
+            <p:cNvPr id="19" name="Rectangle 18"/>
+            <p:cNvSpPr/>
+            <p:nvPr/>
+          </p:nvSpPr>
+          <p:spPr>
+            <a:xfrm>
+              <a:off x="4742242" y="876001"/>
+              <a:ext cx="3001701" cy="5882186"/>
+            </a:xfrm>
+            <a:prstGeom prst="rect">
+              <a:avLst/>
+            </a:prstGeom>
+            <a:noFill/>
+          </p:spPr>
+          <p:style>
+            <a:lnRef idx="1">
+              <a:schemeClr val="accent1"/>
+            </a:lnRef>
+            <a:fillRef idx="3">
+              <a:schemeClr val="accent1"/>
+            </a:fillRef>
+            <a:effectRef idx="2">
+              <a:schemeClr val="accent1"/>
+            </a:effectRef>
+            <a:fontRef idx="minor">
+              <a:schemeClr val="lt1"/>
+            </a:fontRef>
+          </p:style>
+          <p:txBody>
+            <a:bodyPr rtlCol="0" anchor="ctr"/>
+            <a:lstStyle/>
+            <a:p>
+              <a:pPr algn="ctr"/>
+              <a:endParaRPr lang="en-US"/>
+            </a:p>
+          </p:txBody>
+        </p:sp>
+      </p:grpSp>
     </p:spTree>
     <p:extLst>
       <p:ext uri="{BB962C8B-B14F-4D97-AF65-F5344CB8AC3E}">
         <p14:creationId xmlns:p14="http://schemas.microsoft.com/office/powerpoint/2010/main" val="2110327322"/>
+      </p:ext>
+    </p:extLst>
+  </p:cSld>
+  <p:clrMapOvr>
+    <a:masterClrMapping/>
+  </p:clrMapOvr>
+</p:sld>
+</file>
+
+<file path=ppt/slides/slide7.xml><?xml version="1.0" encoding="utf-8"?>
+<p:sld xmlns:a="http://schemas.openxmlformats.org/drawingml/2006/main" xmlns:r="http://schemas.openxmlformats.org/officeDocument/2006/relationships" xmlns:p="http://schemas.openxmlformats.org/presentationml/2006/main">
+  <p:cSld>
+    <p:spTree>
+      <p:nvGrpSpPr>
+        <p:cNvPr id="1" name=""/>
+        <p:cNvGrpSpPr/>
+        <p:nvPr/>
+      </p:nvGrpSpPr>
+      <p:grpSpPr>
+        <a:xfrm>
+          <a:off x="0" y="0"/>
+          <a:ext cx="0" cy="0"/>
+          <a:chOff x="0" y="0"/>
+          <a:chExt cx="0" cy="0"/>
+        </a:xfrm>
+      </p:grpSpPr>
+      <p:grpSp>
+        <p:nvGrpSpPr>
+          <p:cNvPr id="6" name="Group 5"/>
+          <p:cNvGrpSpPr/>
+          <p:nvPr/>
+        </p:nvGrpSpPr>
+        <p:grpSpPr>
+          <a:xfrm>
+            <a:off x="2429585" y="160835"/>
+            <a:ext cx="4926841" cy="5841241"/>
+            <a:chOff x="2429585" y="160835"/>
+            <a:chExt cx="4926841" cy="5841241"/>
+          </a:xfrm>
+        </p:grpSpPr>
+        <p:pic>
+          <p:nvPicPr>
+            <p:cNvPr id="4" name="Picture 3"/>
+            <p:cNvPicPr>
+              <a:picLocks noChangeAspect="1"/>
+            </p:cNvPicPr>
+            <p:nvPr/>
+          </p:nvPicPr>
+          <p:blipFill>
+            <a:blip r:embed="rId2">
+              <a:extLst>
+                <a:ext uri="{28A0092B-C50C-407E-A947-70E740481C1C}">
+                  <a14:useLocalDpi xmlns:a14="http://schemas.microsoft.com/office/drawing/2010/main" val="0"/>
+                </a:ext>
+              </a:extLst>
+            </a:blip>
+            <a:stretch>
+              <a:fillRect/>
+            </a:stretch>
+          </p:blipFill>
+          <p:spPr>
+            <a:xfrm>
+              <a:off x="2511756" y="1645976"/>
+              <a:ext cx="4762500" cy="4356100"/>
+            </a:xfrm>
+            <a:prstGeom prst="rect">
+              <a:avLst/>
+            </a:prstGeom>
+          </p:spPr>
+        </p:pic>
+        <p:sp>
+          <p:nvSpPr>
+            <p:cNvPr id="5" name="Rectangle 4"/>
+            <p:cNvSpPr/>
+            <p:nvPr/>
+          </p:nvSpPr>
+          <p:spPr>
+            <a:xfrm>
+              <a:off x="2429585" y="160835"/>
+              <a:ext cx="4926841" cy="5841241"/>
+            </a:xfrm>
+            <a:prstGeom prst="rect">
+              <a:avLst/>
+            </a:prstGeom>
+            <a:noFill/>
+            <a:ln>
+              <a:solidFill>
+                <a:schemeClr val="accent1">
+                  <a:shade val="95000"/>
+                  <a:satMod val="105000"/>
+                </a:schemeClr>
+              </a:solidFill>
+            </a:ln>
+            <a:effectLst>
+              <a:outerShdw blurRad="40000" dist="23000" dir="5400000" rotWithShape="0">
+                <a:srgbClr val="000000">
+                  <a:alpha val="0"/>
+                </a:srgbClr>
+              </a:outerShdw>
+              <a:reflection stA="0" endPos="65000" dist="50800" dir="5400000" sy="-100000" algn="bl" rotWithShape="0"/>
+            </a:effectLst>
+          </p:spPr>
+          <p:style>
+            <a:lnRef idx="1">
+              <a:schemeClr val="accent1"/>
+            </a:lnRef>
+            <a:fillRef idx="3">
+              <a:schemeClr val="accent1"/>
+            </a:fillRef>
+            <a:effectRef idx="2">
+              <a:schemeClr val="accent1"/>
+            </a:effectRef>
+            <a:fontRef idx="minor">
+              <a:schemeClr val="lt1"/>
+            </a:fontRef>
+          </p:style>
+          <p:txBody>
+            <a:bodyPr rtlCol="0" anchor="ctr"/>
+            <a:lstStyle/>
+            <a:p>
+              <a:pPr algn="ctr"/>
+              <a:endParaRPr lang="en-US"/>
+            </a:p>
+          </p:txBody>
+        </p:sp>
+      </p:grpSp>
+    </p:spTree>
+    <p:extLst>
+      <p:ext uri="{BB962C8B-B14F-4D97-AF65-F5344CB8AC3E}">
+        <p14:creationId xmlns:p14="http://schemas.microsoft.com/office/powerpoint/2010/main" val="1573073295"/>
+      </p:ext>
+    </p:extLst>
+  </p:cSld>
+  <p:clrMapOvr>
+    <a:masterClrMapping/>
+  </p:clrMapOvr>
+</p:sld>
+</file>
+
+<file path=ppt/slides/slide8.xml><?xml version="1.0" encoding="utf-8"?>
+<p:sld xmlns:a="http://schemas.openxmlformats.org/drawingml/2006/main" xmlns:r="http://schemas.openxmlformats.org/officeDocument/2006/relationships" xmlns:p="http://schemas.openxmlformats.org/presentationml/2006/main">
+  <p:cSld>
+    <p:spTree>
+      <p:nvGrpSpPr>
+        <p:cNvPr id="1" name=""/>
+        <p:cNvGrpSpPr/>
+        <p:nvPr/>
+      </p:nvGrpSpPr>
+      <p:grpSpPr>
+        <a:xfrm>
+          <a:off x="0" y="0"/>
+          <a:ext cx="0" cy="0"/>
+          <a:chOff x="0" y="0"/>
+          <a:chExt cx="0" cy="0"/>
+        </a:xfrm>
+      </p:grpSpPr>
+      <p:sp>
+        <p:nvSpPr>
+          <p:cNvPr id="10" name="Rounded Rectangle 9"/>
+          <p:cNvSpPr/>
+          <p:nvPr/>
+        </p:nvSpPr>
+        <p:spPr>
+          <a:xfrm>
+            <a:off x="2491156" y="1310184"/>
+            <a:ext cx="3889612" cy="3745565"/>
+          </a:xfrm>
+          <a:prstGeom prst="roundRect">
+            <a:avLst/>
+          </a:prstGeom>
+          <a:solidFill>
+            <a:schemeClr val="bg1"/>
+          </a:solidFill>
+          <a:ln>
+            <a:noFill/>
+          </a:ln>
+        </p:spPr>
+        <p:style>
+          <a:lnRef idx="1">
+            <a:schemeClr val="accent1"/>
+          </a:lnRef>
+          <a:fillRef idx="3">
+            <a:schemeClr val="accent1"/>
+          </a:fillRef>
+          <a:effectRef idx="2">
+            <a:schemeClr val="accent1"/>
+          </a:effectRef>
+          <a:fontRef idx="minor">
+            <a:schemeClr val="lt1"/>
+          </a:fontRef>
+        </p:style>
+        <p:txBody>
+          <a:bodyPr rtlCol="0" anchor="ctr"/>
+          <a:lstStyle/>
+          <a:p>
+            <a:pPr algn="ctr"/>
+            <a:endParaRPr lang="en-US"/>
+          </a:p>
+        </p:txBody>
+      </p:sp>
+      <p:grpSp>
+        <p:nvGrpSpPr>
+          <p:cNvPr id="11" name="Group 10"/>
+          <p:cNvGrpSpPr/>
+          <p:nvPr/>
+        </p:nvGrpSpPr>
+        <p:grpSpPr>
+          <a:xfrm>
+            <a:off x="2620054" y="3707212"/>
+            <a:ext cx="3659112" cy="1133867"/>
+            <a:chOff x="2721655" y="2102928"/>
+            <a:chExt cx="3659112" cy="1133867"/>
+          </a:xfrm>
+        </p:grpSpPr>
+        <p:sp>
+          <p:nvSpPr>
+            <p:cNvPr id="12" name="Rounded Rectangle 11"/>
+            <p:cNvSpPr/>
+            <p:nvPr/>
+          </p:nvSpPr>
+          <p:spPr>
+            <a:xfrm>
+              <a:off x="2721655" y="2102928"/>
+              <a:ext cx="3659112" cy="1133867"/>
+            </a:xfrm>
+            <a:prstGeom prst="roundRect">
+              <a:avLst>
+                <a:gd name="adj" fmla="val 13996"/>
+              </a:avLst>
+            </a:prstGeom>
+            <a:solidFill>
+              <a:srgbClr val="326E22"/>
+            </a:solidFill>
+            <a:ln>
+              <a:noFill/>
+            </a:ln>
+          </p:spPr>
+          <p:style>
+            <a:lnRef idx="1">
+              <a:schemeClr val="accent1"/>
+            </a:lnRef>
+            <a:fillRef idx="3">
+              <a:schemeClr val="accent1"/>
+            </a:fillRef>
+            <a:effectRef idx="2">
+              <a:schemeClr val="accent1"/>
+            </a:effectRef>
+            <a:fontRef idx="minor">
+              <a:schemeClr val="lt1"/>
+            </a:fontRef>
+          </p:style>
+          <p:txBody>
+            <a:bodyPr rtlCol="0" anchor="ctr"/>
+            <a:lstStyle/>
+            <a:p>
+              <a:pPr algn="ctr"/>
+              <a:endParaRPr lang="en-US"/>
+            </a:p>
+          </p:txBody>
+        </p:sp>
+        <p:sp>
+          <p:nvSpPr>
+            <p:cNvPr id="13" name="TextBox 12"/>
+            <p:cNvSpPr txBox="1"/>
+            <p:nvPr/>
+          </p:nvSpPr>
+          <p:spPr>
+            <a:xfrm>
+              <a:off x="2993821" y="2208196"/>
+              <a:ext cx="3114781" cy="923330"/>
+            </a:xfrm>
+            <a:prstGeom prst="rect">
+              <a:avLst/>
+            </a:prstGeom>
+            <a:solidFill>
+              <a:srgbClr val="326E22"/>
+            </a:solidFill>
+            <a:ln>
+              <a:noFill/>
+            </a:ln>
+          </p:spPr>
+          <p:txBody>
+            <a:bodyPr wrap="square" rtlCol="0">
+              <a:spAutoFit/>
+            </a:bodyPr>
+            <a:lstStyle/>
+            <a:p>
+              <a:pPr algn="ctr"/>
+              <a:r>
+                <a:rPr lang="en-US" sz="5400" dirty="0" smtClean="0">
+                  <a:ln w="18415" cmpd="sng">
+                    <a:solidFill>
+                      <a:srgbClr val="FFFFFF"/>
+                    </a:solidFill>
+                    <a:prstDash val="solid"/>
+                  </a:ln>
+                  <a:solidFill>
+                    <a:srgbClr val="FFFFFF"/>
+                  </a:solidFill>
+                  <a:effectLst>
+                    <a:outerShdw blurRad="63500" dir="3600000" algn="tl" rotWithShape="0">
+                      <a:srgbClr val="000000">
+                        <a:alpha val="70000"/>
+                      </a:srgbClr>
+                    </a:outerShdw>
+                  </a:effectLst>
+                  <a:latin typeface="Chalkboard"/>
+                </a:rPr>
+                <a:t>Resume</a:t>
+              </a:r>
+            </a:p>
+          </p:txBody>
+        </p:sp>
+      </p:grpSp>
+      <p:grpSp>
+        <p:nvGrpSpPr>
+          <p:cNvPr id="14" name="Group 13"/>
+          <p:cNvGrpSpPr/>
+          <p:nvPr/>
+        </p:nvGrpSpPr>
+        <p:grpSpPr>
+          <a:xfrm>
+            <a:off x="2620054" y="2468077"/>
+            <a:ext cx="3659112" cy="1133867"/>
+            <a:chOff x="2721655" y="2102928"/>
+            <a:chExt cx="3659112" cy="1133867"/>
+          </a:xfrm>
+        </p:grpSpPr>
+        <p:sp>
+          <p:nvSpPr>
+            <p:cNvPr id="15" name="Rounded Rectangle 14"/>
+            <p:cNvSpPr/>
+            <p:nvPr/>
+          </p:nvSpPr>
+          <p:spPr>
+            <a:xfrm>
+              <a:off x="2721655" y="2102928"/>
+              <a:ext cx="3659112" cy="1133867"/>
+            </a:xfrm>
+            <a:prstGeom prst="roundRect">
+              <a:avLst>
+                <a:gd name="adj" fmla="val 13996"/>
+              </a:avLst>
+            </a:prstGeom>
+            <a:solidFill>
+              <a:srgbClr val="326E22"/>
+            </a:solidFill>
+            <a:ln>
+              <a:noFill/>
+            </a:ln>
+          </p:spPr>
+          <p:style>
+            <a:lnRef idx="1">
+              <a:schemeClr val="accent1"/>
+            </a:lnRef>
+            <a:fillRef idx="3">
+              <a:schemeClr val="accent1"/>
+            </a:fillRef>
+            <a:effectRef idx="2">
+              <a:schemeClr val="accent1"/>
+            </a:effectRef>
+            <a:fontRef idx="minor">
+              <a:schemeClr val="lt1"/>
+            </a:fontRef>
+          </p:style>
+          <p:txBody>
+            <a:bodyPr rtlCol="0" anchor="ctr"/>
+            <a:lstStyle/>
+            <a:p>
+              <a:pPr algn="ctr"/>
+              <a:endParaRPr lang="en-US"/>
+            </a:p>
+          </p:txBody>
+        </p:sp>
+        <p:sp>
+          <p:nvSpPr>
+            <p:cNvPr id="16" name="TextBox 15"/>
+            <p:cNvSpPr txBox="1"/>
+            <p:nvPr/>
+          </p:nvSpPr>
+          <p:spPr>
+            <a:xfrm>
+              <a:off x="2993821" y="2208196"/>
+              <a:ext cx="3114781" cy="923330"/>
+            </a:xfrm>
+            <a:prstGeom prst="rect">
+              <a:avLst/>
+            </a:prstGeom>
+            <a:solidFill>
+              <a:srgbClr val="326E22"/>
+            </a:solidFill>
+            <a:ln>
+              <a:noFill/>
+            </a:ln>
+          </p:spPr>
+          <p:txBody>
+            <a:bodyPr wrap="square" rtlCol="0">
+              <a:spAutoFit/>
+            </a:bodyPr>
+            <a:lstStyle/>
+            <a:p>
+              <a:pPr algn="ctr"/>
+              <a:r>
+                <a:rPr lang="en-US" sz="5400" dirty="0" smtClean="0">
+                  <a:ln w="18415" cmpd="sng">
+                    <a:solidFill>
+                      <a:srgbClr val="FFFFFF"/>
+                    </a:solidFill>
+                    <a:prstDash val="solid"/>
+                  </a:ln>
+                  <a:solidFill>
+                    <a:srgbClr val="FFFFFF"/>
+                  </a:solidFill>
+                  <a:effectLst>
+                    <a:outerShdw blurRad="63500" dir="3600000" algn="tl" rotWithShape="0">
+                      <a:srgbClr val="000000">
+                        <a:alpha val="70000"/>
+                      </a:srgbClr>
+                    </a:outerShdw>
+                  </a:effectLst>
+                  <a:latin typeface="Chalkboard"/>
+                </a:rPr>
+                <a:t>Quit</a:t>
+              </a:r>
+              <a:endParaRPr lang="en-US" sz="5400" dirty="0">
+                <a:ln w="18415" cmpd="sng">
+                  <a:solidFill>
+                    <a:srgbClr val="FFFFFF"/>
+                  </a:solidFill>
+                  <a:prstDash val="solid"/>
+                </a:ln>
+                <a:solidFill>
+                  <a:srgbClr val="FFFFFF"/>
+                </a:solidFill>
+                <a:effectLst>
+                  <a:outerShdw blurRad="63500" dir="3600000" algn="tl" rotWithShape="0">
+                    <a:srgbClr val="000000">
+                      <a:alpha val="70000"/>
+                    </a:srgbClr>
+                  </a:outerShdw>
+                </a:effectLst>
+                <a:latin typeface="Chalkboard"/>
+              </a:endParaRPr>
+            </a:p>
+          </p:txBody>
+        </p:sp>
+      </p:grpSp>
+    </p:spTree>
+    <p:extLst>
+      <p:ext uri="{BB962C8B-B14F-4D97-AF65-F5344CB8AC3E}">
+        <p14:creationId xmlns:p14="http://schemas.microsoft.com/office/powerpoint/2010/main" val="1032393210"/>
       </p:ext>
     </p:extLst>
   </p:cSld>

</xml_diff>

<commit_message>
1. Added entering tank mode upon running into a pin
</commit_message>
<xml_diff>
--- a/MonkeyPinAssets.pptx
+++ b/MonkeyPinAssets.pptx
@@ -13,6 +13,7 @@
     <p:sldId id="261" r:id="rId7"/>
     <p:sldId id="262" r:id="rId8"/>
     <p:sldId id="263" r:id="rId9"/>
+    <p:sldId id="264" r:id="rId10"/>
   </p:sldIdLst>
   <p:sldSz cx="9144000" cy="6858000" type="screen4x3"/>
   <p:notesSz cx="6858000" cy="9144000"/>
@@ -4927,8 +4928,8 @@
         </p:nvSpPr>
         <p:spPr>
           <a:xfrm>
-            <a:off x="2491156" y="1310184"/>
-            <a:ext cx="3889612" cy="3745565"/>
+            <a:off x="2491156" y="1162458"/>
+            <a:ext cx="4114360" cy="3900861"/>
           </a:xfrm>
           <a:prstGeom prst="roundRect">
             <a:avLst/>
@@ -4971,7 +4972,7 @@
         </p:nvGrpSpPr>
         <p:grpSpPr>
           <a:xfrm>
-            <a:off x="2620054" y="3707212"/>
+            <a:off x="2718780" y="3561183"/>
             <a:ext cx="3659112" cy="1133867"/>
             <a:chOff x="2721655" y="2102928"/>
             <a:chExt cx="3659112" cy="1133867"/>
@@ -5085,7 +5086,7 @@
         </p:nvGrpSpPr>
         <p:grpSpPr>
           <a:xfrm>
-            <a:off x="2620054" y="2468077"/>
+            <a:off x="2718780" y="2210386"/>
             <a:ext cx="3659112" cy="1133867"/>
             <a:chOff x="2721655" y="2102928"/>
             <a:chExt cx="3659112" cy="1133867"/>
@@ -5210,10 +5211,829 @@
           </p:txBody>
         </p:sp>
       </p:grpSp>
+      <p:sp>
+        <p:nvSpPr>
+          <p:cNvPr id="17" name="TextBox 16"/>
+          <p:cNvSpPr txBox="1"/>
+          <p:nvPr/>
+        </p:nvSpPr>
+        <p:spPr>
+          <a:xfrm>
+            <a:off x="2990946" y="1162459"/>
+            <a:ext cx="3114781" cy="830997"/>
+          </a:xfrm>
+          <a:prstGeom prst="rect">
+            <a:avLst/>
+          </a:prstGeom>
+          <a:noFill/>
+        </p:spPr>
+        <p:txBody>
+          <a:bodyPr wrap="square" rtlCol="0">
+            <a:spAutoFit/>
+          </a:bodyPr>
+          <a:lstStyle/>
+          <a:p>
+            <a:pPr algn="ctr"/>
+            <a:r>
+              <a:rPr lang="en-US" sz="4800" u="sng" dirty="0" smtClean="0">
+                <a:latin typeface="Chalkboard" charset="0"/>
+              </a:rPr>
+              <a:t>PAUSED</a:t>
+            </a:r>
+            <a:endParaRPr lang="en-US" sz="4800" u="sng" dirty="0">
+              <a:latin typeface="Chalkboard" charset="0"/>
+            </a:endParaRPr>
+          </a:p>
+        </p:txBody>
+      </p:sp>
+      <p:grpSp>
+        <p:nvGrpSpPr>
+          <p:cNvPr id="18" name="Group 17"/>
+          <p:cNvGrpSpPr/>
+          <p:nvPr/>
+        </p:nvGrpSpPr>
+        <p:grpSpPr>
+          <a:xfrm>
+            <a:off x="1161390" y="5168587"/>
+            <a:ext cx="3659112" cy="1133867"/>
+            <a:chOff x="2721655" y="2102928"/>
+            <a:chExt cx="3659112" cy="1133867"/>
+          </a:xfrm>
+        </p:grpSpPr>
+        <p:sp>
+          <p:nvSpPr>
+            <p:cNvPr id="19" name="Rounded Rectangle 18"/>
+            <p:cNvSpPr/>
+            <p:nvPr/>
+          </p:nvSpPr>
+          <p:spPr>
+            <a:xfrm>
+              <a:off x="2721655" y="2102928"/>
+              <a:ext cx="3659112" cy="1133867"/>
+            </a:xfrm>
+            <a:prstGeom prst="roundRect">
+              <a:avLst>
+                <a:gd name="adj" fmla="val 13996"/>
+              </a:avLst>
+            </a:prstGeom>
+            <a:solidFill>
+              <a:srgbClr val="114A0E"/>
+            </a:solidFill>
+            <a:ln>
+              <a:noFill/>
+            </a:ln>
+          </p:spPr>
+          <p:style>
+            <a:lnRef idx="1">
+              <a:schemeClr val="accent1"/>
+            </a:lnRef>
+            <a:fillRef idx="3">
+              <a:schemeClr val="accent1"/>
+            </a:fillRef>
+            <a:effectRef idx="2">
+              <a:schemeClr val="accent1"/>
+            </a:effectRef>
+            <a:fontRef idx="minor">
+              <a:schemeClr val="lt1"/>
+            </a:fontRef>
+          </p:style>
+          <p:txBody>
+            <a:bodyPr rtlCol="0" anchor="ctr"/>
+            <a:lstStyle/>
+            <a:p>
+              <a:pPr algn="ctr"/>
+              <a:endParaRPr lang="en-US"/>
+            </a:p>
+          </p:txBody>
+        </p:sp>
+        <p:sp>
+          <p:nvSpPr>
+            <p:cNvPr id="20" name="TextBox 19"/>
+            <p:cNvSpPr txBox="1"/>
+            <p:nvPr/>
+          </p:nvSpPr>
+          <p:spPr>
+            <a:xfrm>
+              <a:off x="2993821" y="2208196"/>
+              <a:ext cx="3114781" cy="923330"/>
+            </a:xfrm>
+            <a:prstGeom prst="rect">
+              <a:avLst/>
+            </a:prstGeom>
+            <a:solidFill>
+              <a:srgbClr val="114A0E"/>
+            </a:solidFill>
+            <a:ln>
+              <a:noFill/>
+            </a:ln>
+          </p:spPr>
+          <p:txBody>
+            <a:bodyPr wrap="square" rtlCol="0">
+              <a:spAutoFit/>
+            </a:bodyPr>
+            <a:lstStyle/>
+            <a:p>
+              <a:pPr algn="ctr"/>
+              <a:r>
+                <a:rPr lang="en-US" sz="5400" dirty="0" smtClean="0">
+                  <a:ln w="18415" cmpd="sng">
+                    <a:solidFill>
+                      <a:srgbClr val="FFFFFF"/>
+                    </a:solidFill>
+                    <a:prstDash val="solid"/>
+                  </a:ln>
+                  <a:solidFill>
+                    <a:srgbClr val="FFFFFF"/>
+                  </a:solidFill>
+                  <a:effectLst>
+                    <a:outerShdw blurRad="63500" dir="3600000" algn="tl" rotWithShape="0">
+                      <a:srgbClr val="000000">
+                        <a:alpha val="70000"/>
+                      </a:srgbClr>
+                    </a:outerShdw>
+                  </a:effectLst>
+                  <a:latin typeface="Chalkboard"/>
+                </a:rPr>
+                <a:t>Quit</a:t>
+              </a:r>
+              <a:endParaRPr lang="en-US" sz="5400" dirty="0">
+                <a:ln w="18415" cmpd="sng">
+                  <a:solidFill>
+                    <a:srgbClr val="FFFFFF"/>
+                  </a:solidFill>
+                  <a:prstDash val="solid"/>
+                </a:ln>
+                <a:solidFill>
+                  <a:srgbClr val="FFFFFF"/>
+                </a:solidFill>
+                <a:effectLst>
+                  <a:outerShdw blurRad="63500" dir="3600000" algn="tl" rotWithShape="0">
+                    <a:srgbClr val="000000">
+                      <a:alpha val="70000"/>
+                    </a:srgbClr>
+                  </a:outerShdw>
+                </a:effectLst>
+                <a:latin typeface="Chalkboard"/>
+              </a:endParaRPr>
+            </a:p>
+          </p:txBody>
+        </p:sp>
+      </p:grpSp>
+      <p:grpSp>
+        <p:nvGrpSpPr>
+          <p:cNvPr id="21" name="Group 20"/>
+          <p:cNvGrpSpPr/>
+          <p:nvPr/>
+        </p:nvGrpSpPr>
+        <p:grpSpPr>
+          <a:xfrm>
+            <a:off x="5092668" y="5168587"/>
+            <a:ext cx="3659112" cy="1133867"/>
+            <a:chOff x="2721655" y="2102928"/>
+            <a:chExt cx="3659112" cy="1133867"/>
+          </a:xfrm>
+        </p:grpSpPr>
+        <p:sp>
+          <p:nvSpPr>
+            <p:cNvPr id="22" name="Rounded Rectangle 21"/>
+            <p:cNvSpPr/>
+            <p:nvPr/>
+          </p:nvSpPr>
+          <p:spPr>
+            <a:xfrm>
+              <a:off x="2721655" y="2102928"/>
+              <a:ext cx="3659112" cy="1133867"/>
+            </a:xfrm>
+            <a:prstGeom prst="roundRect">
+              <a:avLst>
+                <a:gd name="adj" fmla="val 13996"/>
+              </a:avLst>
+            </a:prstGeom>
+            <a:solidFill>
+              <a:srgbClr val="114A0E"/>
+            </a:solidFill>
+            <a:ln>
+              <a:noFill/>
+            </a:ln>
+          </p:spPr>
+          <p:style>
+            <a:lnRef idx="1">
+              <a:schemeClr val="accent1"/>
+            </a:lnRef>
+            <a:fillRef idx="3">
+              <a:schemeClr val="accent1"/>
+            </a:fillRef>
+            <a:effectRef idx="2">
+              <a:schemeClr val="accent1"/>
+            </a:effectRef>
+            <a:fontRef idx="minor">
+              <a:schemeClr val="lt1"/>
+            </a:fontRef>
+          </p:style>
+          <p:txBody>
+            <a:bodyPr rtlCol="0" anchor="ctr"/>
+            <a:lstStyle/>
+            <a:p>
+              <a:pPr algn="ctr"/>
+              <a:endParaRPr lang="en-US"/>
+            </a:p>
+          </p:txBody>
+        </p:sp>
+        <p:sp>
+          <p:nvSpPr>
+            <p:cNvPr id="23" name="TextBox 22"/>
+            <p:cNvSpPr txBox="1"/>
+            <p:nvPr/>
+          </p:nvSpPr>
+          <p:spPr>
+            <a:xfrm>
+              <a:off x="2993821" y="2208196"/>
+              <a:ext cx="3114781" cy="923330"/>
+            </a:xfrm>
+            <a:prstGeom prst="rect">
+              <a:avLst/>
+            </a:prstGeom>
+            <a:solidFill>
+              <a:srgbClr val="114A0E"/>
+            </a:solidFill>
+            <a:ln>
+              <a:noFill/>
+            </a:ln>
+          </p:spPr>
+          <p:txBody>
+            <a:bodyPr wrap="square" rtlCol="0">
+              <a:spAutoFit/>
+            </a:bodyPr>
+            <a:lstStyle/>
+            <a:p>
+              <a:pPr algn="ctr"/>
+              <a:r>
+                <a:rPr lang="en-US" sz="5400" dirty="0" smtClean="0">
+                  <a:ln w="18415" cmpd="sng">
+                    <a:solidFill>
+                      <a:srgbClr val="FFFFFF"/>
+                    </a:solidFill>
+                    <a:prstDash val="solid"/>
+                  </a:ln>
+                  <a:solidFill>
+                    <a:srgbClr val="FFFFFF"/>
+                  </a:solidFill>
+                  <a:effectLst>
+                    <a:outerShdw blurRad="63500" dir="3600000" algn="tl" rotWithShape="0">
+                      <a:srgbClr val="000000">
+                        <a:alpha val="70000"/>
+                      </a:srgbClr>
+                    </a:outerShdw>
+                  </a:effectLst>
+                  <a:latin typeface="Chalkboard"/>
+                </a:rPr>
+                <a:t>Resume</a:t>
+              </a:r>
+              <a:endParaRPr lang="en-US" sz="5400" dirty="0">
+                <a:ln w="18415" cmpd="sng">
+                  <a:solidFill>
+                    <a:srgbClr val="FFFFFF"/>
+                  </a:solidFill>
+                  <a:prstDash val="solid"/>
+                </a:ln>
+                <a:solidFill>
+                  <a:srgbClr val="FFFFFF"/>
+                </a:solidFill>
+                <a:effectLst>
+                  <a:outerShdw blurRad="63500" dir="3600000" algn="tl" rotWithShape="0">
+                    <a:srgbClr val="000000">
+                      <a:alpha val="70000"/>
+                    </a:srgbClr>
+                  </a:outerShdw>
+                </a:effectLst>
+                <a:latin typeface="Chalkboard"/>
+              </a:endParaRPr>
+            </a:p>
+          </p:txBody>
+        </p:sp>
+      </p:grpSp>
     </p:spTree>
     <p:extLst>
       <p:ext uri="{BB962C8B-B14F-4D97-AF65-F5344CB8AC3E}">
         <p14:creationId xmlns:p14="http://schemas.microsoft.com/office/powerpoint/2010/main" val="1032393210"/>
+      </p:ext>
+    </p:extLst>
+  </p:cSld>
+  <p:clrMapOvr>
+    <a:masterClrMapping/>
+  </p:clrMapOvr>
+</p:sld>
+</file>
+
+<file path=ppt/slides/slide9.xml><?xml version="1.0" encoding="utf-8"?>
+<p:sld xmlns:a="http://schemas.openxmlformats.org/drawingml/2006/main" xmlns:r="http://schemas.openxmlformats.org/officeDocument/2006/relationships" xmlns:p="http://schemas.openxmlformats.org/presentationml/2006/main">
+  <p:cSld>
+    <p:spTree>
+      <p:nvGrpSpPr>
+        <p:cNvPr id="1" name=""/>
+        <p:cNvGrpSpPr/>
+        <p:nvPr/>
+      </p:nvGrpSpPr>
+      <p:grpSpPr>
+        <a:xfrm>
+          <a:off x="0" y="0"/>
+          <a:ext cx="0" cy="0"/>
+          <a:chOff x="0" y="0"/>
+          <a:chExt cx="0" cy="0"/>
+        </a:xfrm>
+      </p:grpSpPr>
+      <p:sp>
+        <p:nvSpPr>
+          <p:cNvPr id="16" name="Oval 15"/>
+          <p:cNvSpPr/>
+          <p:nvPr/>
+        </p:nvSpPr>
+        <p:spPr>
+          <a:xfrm>
+            <a:off x="5551731" y="3343349"/>
+            <a:ext cx="2106571" cy="877824"/>
+          </a:xfrm>
+          <a:prstGeom prst="ellipse">
+            <a:avLst/>
+          </a:prstGeom>
+          <a:solidFill>
+            <a:schemeClr val="tx1">
+              <a:alpha val="26000"/>
+            </a:schemeClr>
+          </a:solidFill>
+          <a:ln>
+            <a:noFill/>
+          </a:ln>
+          <a:effectLst>
+            <a:outerShdw blurRad="40000" dist="23000" dir="5400000" rotWithShape="0">
+              <a:schemeClr val="tx1">
+                <a:alpha val="35000"/>
+              </a:schemeClr>
+            </a:outerShdw>
+          </a:effectLst>
+        </p:spPr>
+        <p:style>
+          <a:lnRef idx="1">
+            <a:schemeClr val="accent1"/>
+          </a:lnRef>
+          <a:fillRef idx="3">
+            <a:schemeClr val="accent1"/>
+          </a:fillRef>
+          <a:effectRef idx="2">
+            <a:schemeClr val="accent1"/>
+          </a:effectRef>
+          <a:fontRef idx="minor">
+            <a:schemeClr val="lt1"/>
+          </a:fontRef>
+        </p:style>
+        <p:txBody>
+          <a:bodyPr rtlCol="0" anchor="ctr"/>
+          <a:lstStyle/>
+          <a:p>
+            <a:pPr algn="ctr"/>
+            <a:endParaRPr lang="en-US"/>
+          </a:p>
+        </p:txBody>
+      </p:sp>
+      <p:sp>
+        <p:nvSpPr>
+          <p:cNvPr id="12" name="Oval 11"/>
+          <p:cNvSpPr/>
+          <p:nvPr/>
+        </p:nvSpPr>
+        <p:spPr>
+          <a:xfrm>
+            <a:off x="5968448" y="3621549"/>
+            <a:ext cx="432054" cy="407280"/>
+          </a:xfrm>
+          <a:prstGeom prst="ellipse">
+            <a:avLst/>
+          </a:prstGeom>
+          <a:solidFill>
+            <a:srgbClr val="85570A"/>
+          </a:solidFill>
+          <a:ln>
+            <a:noFill/>
+          </a:ln>
+        </p:spPr>
+        <p:style>
+          <a:lnRef idx="1">
+            <a:schemeClr val="accent1"/>
+          </a:lnRef>
+          <a:fillRef idx="3">
+            <a:schemeClr val="accent1"/>
+          </a:fillRef>
+          <a:effectRef idx="2">
+            <a:schemeClr val="accent1"/>
+          </a:effectRef>
+          <a:fontRef idx="minor">
+            <a:schemeClr val="lt1"/>
+          </a:fontRef>
+        </p:style>
+        <p:txBody>
+          <a:bodyPr rtlCol="0" anchor="ctr"/>
+          <a:lstStyle/>
+          <a:p>
+            <a:pPr algn="ctr"/>
+            <a:endParaRPr lang="en-US"/>
+          </a:p>
+        </p:txBody>
+      </p:sp>
+      <p:sp>
+        <p:nvSpPr>
+          <p:cNvPr id="10" name="Rounded Rectangle 9"/>
+          <p:cNvSpPr/>
+          <p:nvPr/>
+        </p:nvSpPr>
+        <p:spPr>
+          <a:xfrm>
+            <a:off x="5590032" y="2535936"/>
+            <a:ext cx="440436" cy="736040"/>
+          </a:xfrm>
+          <a:prstGeom prst="roundRect">
+            <a:avLst/>
+          </a:prstGeom>
+          <a:solidFill>
+            <a:srgbClr val="85570A"/>
+          </a:solidFill>
+          <a:ln>
+            <a:noFill/>
+          </a:ln>
+          <a:effectLst>
+            <a:outerShdw blurRad="40000" dist="23000" dir="5400000" rotWithShape="0">
+              <a:srgbClr val="85570A">
+                <a:alpha val="35000"/>
+              </a:srgbClr>
+            </a:outerShdw>
+          </a:effectLst>
+        </p:spPr>
+        <p:style>
+          <a:lnRef idx="1">
+            <a:schemeClr val="accent1"/>
+          </a:lnRef>
+          <a:fillRef idx="3">
+            <a:schemeClr val="accent1"/>
+          </a:fillRef>
+          <a:effectRef idx="2">
+            <a:schemeClr val="accent1"/>
+          </a:effectRef>
+          <a:fontRef idx="minor">
+            <a:schemeClr val="lt1"/>
+          </a:fontRef>
+        </p:style>
+        <p:txBody>
+          <a:bodyPr rtlCol="0" anchor="ctr"/>
+          <a:lstStyle/>
+          <a:p>
+            <a:pPr algn="ctr"/>
+            <a:endParaRPr lang="en-US"/>
+          </a:p>
+        </p:txBody>
+      </p:sp>
+      <p:pic>
+        <p:nvPicPr>
+          <p:cNvPr id="5" name="Picture 4"/>
+          <p:cNvPicPr>
+            <a:picLocks noChangeAspect="1"/>
+          </p:cNvPicPr>
+          <p:nvPr/>
+        </p:nvPicPr>
+        <p:blipFill>
+          <a:blip r:embed="rId2">
+            <a:extLst>
+              <a:ext uri="{28A0092B-C50C-407E-A947-70E740481C1C}">
+                <a14:useLocalDpi xmlns:a14="http://schemas.microsoft.com/office/drawing/2010/main" val="0"/>
+              </a:ext>
+            </a:extLst>
+          </a:blip>
+          <a:stretch>
+            <a:fillRect/>
+          </a:stretch>
+        </p:blipFill>
+        <p:spPr>
+          <a:xfrm>
+            <a:off x="2814320" y="4547616"/>
+            <a:ext cx="897128" cy="897128"/>
+          </a:xfrm>
+          <a:prstGeom prst="rect">
+            <a:avLst/>
+          </a:prstGeom>
+        </p:spPr>
+      </p:pic>
+      <p:sp>
+        <p:nvSpPr>
+          <p:cNvPr id="7" name="Trapezoid 6"/>
+          <p:cNvSpPr/>
+          <p:nvPr/>
+        </p:nvSpPr>
+        <p:spPr>
+          <a:xfrm rot="10800000">
+            <a:off x="5577840" y="3236352"/>
+            <a:ext cx="2042160" cy="512064"/>
+          </a:xfrm>
+          <a:prstGeom prst="trapezoid">
+            <a:avLst/>
+          </a:prstGeom>
+          <a:solidFill>
+            <a:srgbClr val="85570A"/>
+          </a:solidFill>
+          <a:ln>
+            <a:noFill/>
+          </a:ln>
+        </p:spPr>
+        <p:style>
+          <a:lnRef idx="1">
+            <a:schemeClr val="accent1"/>
+          </a:lnRef>
+          <a:fillRef idx="3">
+            <a:schemeClr val="accent1"/>
+          </a:fillRef>
+          <a:effectRef idx="2">
+            <a:schemeClr val="accent1"/>
+          </a:effectRef>
+          <a:fontRef idx="minor">
+            <a:schemeClr val="lt1"/>
+          </a:fontRef>
+        </p:style>
+        <p:txBody>
+          <a:bodyPr rtlCol="0" anchor="ctr"/>
+          <a:lstStyle/>
+          <a:p>
+            <a:pPr algn="ctr"/>
+            <a:endParaRPr lang="en-US"/>
+          </a:p>
+        </p:txBody>
+      </p:sp>
+      <p:sp>
+        <p:nvSpPr>
+          <p:cNvPr id="8" name="Oval 7"/>
+          <p:cNvSpPr/>
+          <p:nvPr/>
+        </p:nvSpPr>
+        <p:spPr>
+          <a:xfrm>
+            <a:off x="7062216" y="3088269"/>
+            <a:ext cx="725424" cy="661923"/>
+          </a:xfrm>
+          <a:prstGeom prst="ellipse">
+            <a:avLst/>
+          </a:prstGeom>
+          <a:solidFill>
+            <a:srgbClr val="85570A"/>
+          </a:solidFill>
+          <a:ln>
+            <a:noFill/>
+          </a:ln>
+        </p:spPr>
+        <p:style>
+          <a:lnRef idx="1">
+            <a:schemeClr val="accent1"/>
+          </a:lnRef>
+          <a:fillRef idx="3">
+            <a:schemeClr val="accent1"/>
+          </a:fillRef>
+          <a:effectRef idx="2">
+            <a:schemeClr val="accent1"/>
+          </a:effectRef>
+          <a:fontRef idx="minor">
+            <a:schemeClr val="lt1"/>
+          </a:fontRef>
+        </p:style>
+        <p:txBody>
+          <a:bodyPr rtlCol="0" anchor="ctr"/>
+          <a:lstStyle/>
+          <a:p>
+            <a:pPr algn="ctr"/>
+            <a:endParaRPr lang="en-US"/>
+          </a:p>
+        </p:txBody>
+      </p:sp>
+      <p:sp>
+        <p:nvSpPr>
+          <p:cNvPr id="9" name="Oval 8"/>
+          <p:cNvSpPr/>
+          <p:nvPr/>
+        </p:nvSpPr>
+        <p:spPr>
+          <a:xfrm>
+            <a:off x="5422392" y="3100461"/>
+            <a:ext cx="725424" cy="661923"/>
+          </a:xfrm>
+          <a:prstGeom prst="ellipse">
+            <a:avLst/>
+          </a:prstGeom>
+          <a:solidFill>
+            <a:srgbClr val="85570A"/>
+          </a:solidFill>
+          <a:ln>
+            <a:noFill/>
+          </a:ln>
+        </p:spPr>
+        <p:style>
+          <a:lnRef idx="1">
+            <a:schemeClr val="accent1"/>
+          </a:lnRef>
+          <a:fillRef idx="3">
+            <a:schemeClr val="accent1"/>
+          </a:fillRef>
+          <a:effectRef idx="2">
+            <a:schemeClr val="accent1"/>
+          </a:effectRef>
+          <a:fontRef idx="minor">
+            <a:schemeClr val="lt1"/>
+          </a:fontRef>
+        </p:style>
+        <p:txBody>
+          <a:bodyPr rtlCol="0" anchor="ctr"/>
+          <a:lstStyle/>
+          <a:p>
+            <a:pPr algn="ctr"/>
+            <a:endParaRPr lang="en-US"/>
+          </a:p>
+        </p:txBody>
+      </p:sp>
+      <p:sp>
+        <p:nvSpPr>
+          <p:cNvPr id="6" name="Oval 5"/>
+          <p:cNvSpPr/>
+          <p:nvPr/>
+        </p:nvSpPr>
+        <p:spPr>
+          <a:xfrm>
+            <a:off x="6147816" y="2834016"/>
+            <a:ext cx="914400" cy="914400"/>
+          </a:xfrm>
+          <a:prstGeom prst="ellipse">
+            <a:avLst/>
+          </a:prstGeom>
+          <a:solidFill>
+            <a:srgbClr val="85570A"/>
+          </a:solidFill>
+          <a:ln>
+            <a:noFill/>
+          </a:ln>
+        </p:spPr>
+        <p:style>
+          <a:lnRef idx="1">
+            <a:schemeClr val="accent1"/>
+          </a:lnRef>
+          <a:fillRef idx="3">
+            <a:schemeClr val="accent1"/>
+          </a:fillRef>
+          <a:effectRef idx="2">
+            <a:schemeClr val="accent1"/>
+          </a:effectRef>
+          <a:fontRef idx="minor">
+            <a:schemeClr val="lt1"/>
+          </a:fontRef>
+        </p:style>
+        <p:txBody>
+          <a:bodyPr rtlCol="0" anchor="ctr"/>
+          <a:lstStyle/>
+          <a:p>
+            <a:pPr algn="ctr"/>
+            <a:endParaRPr lang="en-US"/>
+          </a:p>
+        </p:txBody>
+      </p:sp>
+      <p:sp>
+        <p:nvSpPr>
+          <p:cNvPr id="11" name="Triangle 10"/>
+          <p:cNvSpPr/>
+          <p:nvPr/>
+        </p:nvSpPr>
+        <p:spPr>
+          <a:xfrm>
+            <a:off x="5659374" y="2109216"/>
+            <a:ext cx="301752" cy="426720"/>
+          </a:xfrm>
+          <a:prstGeom prst="triangle">
+            <a:avLst/>
+          </a:prstGeom>
+          <a:solidFill>
+            <a:srgbClr val="85570A"/>
+          </a:solidFill>
+          <a:ln>
+            <a:noFill/>
+          </a:ln>
+        </p:spPr>
+        <p:style>
+          <a:lnRef idx="1">
+            <a:schemeClr val="accent1"/>
+          </a:lnRef>
+          <a:fillRef idx="3">
+            <a:schemeClr val="accent1"/>
+          </a:fillRef>
+          <a:effectRef idx="2">
+            <a:schemeClr val="accent1"/>
+          </a:effectRef>
+          <a:fontRef idx="minor">
+            <a:schemeClr val="lt1"/>
+          </a:fontRef>
+        </p:style>
+        <p:txBody>
+          <a:bodyPr rtlCol="0" anchor="ctr"/>
+          <a:lstStyle/>
+          <a:p>
+            <a:pPr algn="ctr"/>
+            <a:endParaRPr lang="en-US"/>
+          </a:p>
+        </p:txBody>
+      </p:sp>
+      <p:pic>
+        <p:nvPicPr>
+          <p:cNvPr id="4" name="Picture 3"/>
+          <p:cNvPicPr>
+            <a:picLocks noChangeAspect="1"/>
+          </p:cNvPicPr>
+          <p:nvPr/>
+        </p:nvPicPr>
+        <p:blipFill>
+          <a:blip r:embed="rId3">
+            <a:extLst>
+              <a:ext uri="{28A0092B-C50C-407E-A947-70E740481C1C}">
+                <a14:useLocalDpi xmlns:a14="http://schemas.microsoft.com/office/drawing/2010/main" val="0"/>
+              </a:ext>
+            </a:extLst>
+          </a:blip>
+          <a:stretch>
+            <a:fillRect/>
+          </a:stretch>
+        </p:blipFill>
+        <p:spPr>
+          <a:xfrm rot="10800000">
+            <a:off x="3048395" y="4087061"/>
+            <a:ext cx="428978" cy="1247938"/>
+          </a:xfrm>
+          <a:prstGeom prst="rect">
+            <a:avLst/>
+          </a:prstGeom>
+        </p:spPr>
+      </p:pic>
+      <p:pic>
+        <p:nvPicPr>
+          <p:cNvPr id="13" name="Picture 12"/>
+          <p:cNvPicPr>
+            <a:picLocks noChangeAspect="1"/>
+          </p:cNvPicPr>
+          <p:nvPr/>
+        </p:nvPicPr>
+        <p:blipFill>
+          <a:blip r:embed="rId4">
+            <a:extLst>
+              <a:ext uri="{28A0092B-C50C-407E-A947-70E740481C1C}">
+                <a14:useLocalDpi xmlns:a14="http://schemas.microsoft.com/office/drawing/2010/main" val="0"/>
+              </a:ext>
+            </a:extLst>
+          </a:blip>
+          <a:stretch>
+            <a:fillRect/>
+          </a:stretch>
+        </p:blipFill>
+        <p:spPr>
+          <a:xfrm>
+            <a:off x="2275877" y="1584332"/>
+            <a:ext cx="1687644" cy="1687644"/>
+          </a:xfrm>
+          <a:prstGeom prst="rect">
+            <a:avLst/>
+          </a:prstGeom>
+        </p:spPr>
+      </p:pic>
+      <p:pic>
+        <p:nvPicPr>
+          <p:cNvPr id="14" name="Picture 13"/>
+          <p:cNvPicPr>
+            <a:picLocks noChangeAspect="1"/>
+          </p:cNvPicPr>
+          <p:nvPr/>
+        </p:nvPicPr>
+        <p:blipFill>
+          <a:blip r:embed="rId5">
+            <a:extLst>
+              <a:ext uri="{28A0092B-C50C-407E-A947-70E740481C1C}">
+                <a14:useLocalDpi xmlns:a14="http://schemas.microsoft.com/office/drawing/2010/main" val="0"/>
+              </a:ext>
+            </a:extLst>
+          </a:blip>
+          <a:stretch>
+            <a:fillRect/>
+          </a:stretch>
+        </p:blipFill>
+        <p:spPr>
+          <a:xfrm>
+            <a:off x="608955" y="1706880"/>
+            <a:ext cx="1393581" cy="1393581"/>
+          </a:xfrm>
+          <a:prstGeom prst="rect">
+            <a:avLst/>
+          </a:prstGeom>
+        </p:spPr>
+      </p:pic>
+    </p:spTree>
+    <p:extLst>
+      <p:ext uri="{BB962C8B-B14F-4D97-AF65-F5344CB8AC3E}">
+        <p14:creationId xmlns:p14="http://schemas.microsoft.com/office/powerpoint/2010/main" val="863701152"/>
       </p:ext>
     </p:extLst>
   </p:cSld>

</xml_diff>

<commit_message>
1. Added ball damage and game over behavior
</commit_message>
<xml_diff>
--- a/MonkeyPinAssets.pptx
+++ b/MonkeyPinAssets.pptx
@@ -14,6 +14,7 @@
     <p:sldId id="262" r:id="rId8"/>
     <p:sldId id="263" r:id="rId9"/>
     <p:sldId id="264" r:id="rId10"/>
+    <p:sldId id="265" r:id="rId11"/>
   </p:sldIdLst>
   <p:sldSz cx="9144000" cy="6858000" type="screen4x3"/>
   <p:notesSz cx="6858000" cy="9144000"/>
@@ -3535,6 +3536,431 @@
 </p:sld>
 </file>
 
+<file path=ppt/slides/slide10.xml><?xml version="1.0" encoding="utf-8"?>
+<p:sld xmlns:a="http://schemas.openxmlformats.org/drawingml/2006/main" xmlns:r="http://schemas.openxmlformats.org/officeDocument/2006/relationships" xmlns:p="http://schemas.openxmlformats.org/presentationml/2006/main">
+  <p:cSld>
+    <p:spTree>
+      <p:nvGrpSpPr>
+        <p:cNvPr id="1" name=""/>
+        <p:cNvGrpSpPr/>
+        <p:nvPr/>
+      </p:nvGrpSpPr>
+      <p:grpSpPr>
+        <a:xfrm>
+          <a:off x="0" y="0"/>
+          <a:ext cx="0" cy="0"/>
+          <a:chOff x="0" y="0"/>
+          <a:chExt cx="0" cy="0"/>
+        </a:xfrm>
+      </p:grpSpPr>
+      <p:pic>
+        <p:nvPicPr>
+          <p:cNvPr id="4" name="Picture 3"/>
+          <p:cNvPicPr>
+            <a:picLocks noChangeAspect="1"/>
+          </p:cNvPicPr>
+          <p:nvPr/>
+        </p:nvPicPr>
+        <p:blipFill>
+          <a:blip r:embed="rId2">
+            <a:extLst>
+              <a:ext uri="{28A0092B-C50C-407E-A947-70E740481C1C}">
+                <a14:useLocalDpi xmlns:a14="http://schemas.microsoft.com/office/drawing/2010/main" val="0"/>
+              </a:ext>
+            </a:extLst>
+          </a:blip>
+          <a:stretch>
+            <a:fillRect/>
+          </a:stretch>
+        </p:blipFill>
+        <p:spPr>
+          <a:xfrm>
+            <a:off x="446532" y="547116"/>
+            <a:ext cx="2667000" cy="2667000"/>
+          </a:xfrm>
+          <a:prstGeom prst="rect">
+            <a:avLst/>
+          </a:prstGeom>
+        </p:spPr>
+      </p:pic>
+      <p:grpSp>
+        <p:nvGrpSpPr>
+          <p:cNvPr id="15" name="Group 14"/>
+          <p:cNvGrpSpPr/>
+          <p:nvPr/>
+        </p:nvGrpSpPr>
+        <p:grpSpPr>
+          <a:xfrm>
+            <a:off x="5289804" y="2498026"/>
+            <a:ext cx="958596" cy="814769"/>
+            <a:chOff x="5289804" y="2498026"/>
+            <a:chExt cx="958596" cy="814769"/>
+          </a:xfrm>
+        </p:grpSpPr>
+        <p:grpSp>
+          <p:nvGrpSpPr>
+            <p:cNvPr id="11" name="Group 10"/>
+            <p:cNvGrpSpPr/>
+            <p:nvPr/>
+          </p:nvGrpSpPr>
+          <p:grpSpPr>
+            <a:xfrm>
+              <a:off x="5289804" y="2498026"/>
+              <a:ext cx="763523" cy="810197"/>
+              <a:chOff x="5289804" y="2498026"/>
+              <a:chExt cx="763523" cy="810197"/>
+            </a:xfrm>
+          </p:grpSpPr>
+          <p:sp>
+            <p:nvSpPr>
+              <p:cNvPr id="5" name="Oval 4"/>
+              <p:cNvSpPr/>
+              <p:nvPr/>
+            </p:nvSpPr>
+            <p:spPr>
+              <a:xfrm flipV="1">
+                <a:off x="5289804" y="2646711"/>
+                <a:ext cx="143256" cy="190309"/>
+              </a:xfrm>
+              <a:prstGeom prst="ellipse">
+                <a:avLst/>
+              </a:prstGeom>
+              <a:solidFill>
+                <a:srgbClr val="737373"/>
+              </a:solidFill>
+              <a:ln>
+                <a:solidFill>
+                  <a:srgbClr val="737373"/>
+                </a:solidFill>
+              </a:ln>
+            </p:spPr>
+            <p:style>
+              <a:lnRef idx="1">
+                <a:schemeClr val="accent1"/>
+              </a:lnRef>
+              <a:fillRef idx="3">
+                <a:schemeClr val="accent1"/>
+              </a:fillRef>
+              <a:effectRef idx="2">
+                <a:schemeClr val="accent1"/>
+              </a:effectRef>
+              <a:fontRef idx="minor">
+                <a:schemeClr val="lt1"/>
+              </a:fontRef>
+            </p:style>
+            <p:txBody>
+              <a:bodyPr rtlCol="0" anchor="ctr"/>
+              <a:lstStyle/>
+              <a:p>
+                <a:pPr algn="ctr"/>
+                <a:endParaRPr lang="en-US"/>
+              </a:p>
+            </p:txBody>
+          </p:sp>
+          <p:sp>
+            <p:nvSpPr>
+              <p:cNvPr id="6" name="Oval 5"/>
+              <p:cNvSpPr/>
+              <p:nvPr/>
+            </p:nvSpPr>
+            <p:spPr>
+              <a:xfrm>
+                <a:off x="5577840" y="2498026"/>
+                <a:ext cx="243840" cy="243840"/>
+              </a:xfrm>
+              <a:prstGeom prst="ellipse">
+                <a:avLst/>
+              </a:prstGeom>
+              <a:solidFill>
+                <a:srgbClr val="737373"/>
+              </a:solidFill>
+              <a:ln>
+                <a:noFill/>
+              </a:ln>
+            </p:spPr>
+            <p:style>
+              <a:lnRef idx="1">
+                <a:schemeClr val="accent1"/>
+              </a:lnRef>
+              <a:fillRef idx="3">
+                <a:schemeClr val="accent1"/>
+              </a:fillRef>
+              <a:effectRef idx="2">
+                <a:schemeClr val="accent1"/>
+              </a:effectRef>
+              <a:fontRef idx="minor">
+                <a:schemeClr val="lt1"/>
+              </a:fontRef>
+            </p:style>
+            <p:txBody>
+              <a:bodyPr rtlCol="0" anchor="ctr"/>
+              <a:lstStyle/>
+              <a:p>
+                <a:pPr algn="ctr"/>
+                <a:endParaRPr lang="en-US"/>
+              </a:p>
+            </p:txBody>
+          </p:sp>
+          <p:sp>
+            <p:nvSpPr>
+              <p:cNvPr id="7" name="Oval 6"/>
+              <p:cNvSpPr/>
+              <p:nvPr/>
+            </p:nvSpPr>
+            <p:spPr>
+              <a:xfrm flipV="1">
+                <a:off x="5577840" y="2887219"/>
+                <a:ext cx="243840" cy="222503"/>
+              </a:xfrm>
+              <a:prstGeom prst="ellipse">
+                <a:avLst/>
+              </a:prstGeom>
+              <a:solidFill>
+                <a:srgbClr val="383838"/>
+              </a:solidFill>
+              <a:ln>
+                <a:solidFill>
+                  <a:srgbClr val="383838"/>
+                </a:solidFill>
+              </a:ln>
+            </p:spPr>
+            <p:style>
+              <a:lnRef idx="1">
+                <a:schemeClr val="accent1"/>
+              </a:lnRef>
+              <a:fillRef idx="3">
+                <a:schemeClr val="accent1"/>
+              </a:fillRef>
+              <a:effectRef idx="2">
+                <a:schemeClr val="accent1"/>
+              </a:effectRef>
+              <a:fontRef idx="minor">
+                <a:schemeClr val="lt1"/>
+              </a:fontRef>
+            </p:style>
+            <p:txBody>
+              <a:bodyPr rtlCol="0" anchor="ctr"/>
+              <a:lstStyle/>
+              <a:p>
+                <a:pPr algn="ctr"/>
+                <a:endParaRPr lang="en-US"/>
+              </a:p>
+            </p:txBody>
+          </p:sp>
+          <p:sp>
+            <p:nvSpPr>
+              <p:cNvPr id="8" name="Oval 7"/>
+              <p:cNvSpPr/>
+              <p:nvPr/>
+            </p:nvSpPr>
+            <p:spPr>
+              <a:xfrm>
+                <a:off x="5289804" y="2904363"/>
+                <a:ext cx="280416" cy="403860"/>
+              </a:xfrm>
+              <a:prstGeom prst="ellipse">
+                <a:avLst/>
+              </a:prstGeom>
+              <a:solidFill>
+                <a:srgbClr val="282828"/>
+              </a:solidFill>
+              <a:ln>
+                <a:solidFill>
+                  <a:srgbClr val="383838"/>
+                </a:solidFill>
+              </a:ln>
+              <a:effectLst>
+                <a:outerShdw blurRad="40000" dist="23000" dir="5400000" rotWithShape="0">
+                  <a:srgbClr val="0F0F0F">
+                    <a:alpha val="34902"/>
+                  </a:srgbClr>
+                </a:outerShdw>
+              </a:effectLst>
+            </p:spPr>
+            <p:style>
+              <a:lnRef idx="1">
+                <a:schemeClr val="accent1"/>
+              </a:lnRef>
+              <a:fillRef idx="3">
+                <a:schemeClr val="accent1"/>
+              </a:fillRef>
+              <a:effectRef idx="2">
+                <a:schemeClr val="accent1"/>
+              </a:effectRef>
+              <a:fontRef idx="minor">
+                <a:schemeClr val="lt1"/>
+              </a:fontRef>
+            </p:style>
+            <p:txBody>
+              <a:bodyPr rtlCol="0" anchor="ctr"/>
+              <a:lstStyle/>
+              <a:p>
+                <a:pPr algn="ctr"/>
+                <a:endParaRPr lang="en-US"/>
+              </a:p>
+            </p:txBody>
+          </p:sp>
+          <p:sp>
+            <p:nvSpPr>
+              <p:cNvPr id="9" name="Rectangle 8"/>
+              <p:cNvSpPr/>
+              <p:nvPr/>
+            </p:nvSpPr>
+            <p:spPr>
+              <a:xfrm>
+                <a:off x="5858255" y="2508504"/>
+                <a:ext cx="195072" cy="121920"/>
+              </a:xfrm>
+              <a:prstGeom prst="rect">
+                <a:avLst/>
+              </a:prstGeom>
+              <a:solidFill>
+                <a:srgbClr val="282828"/>
+              </a:solidFill>
+              <a:ln>
+                <a:noFill/>
+              </a:ln>
+              <a:effectLst>
+                <a:outerShdw blurRad="40000" dist="23000" dir="5400000" rotWithShape="0">
+                  <a:srgbClr val="282828">
+                    <a:alpha val="34902"/>
+                  </a:srgbClr>
+                </a:outerShdw>
+              </a:effectLst>
+            </p:spPr>
+            <p:style>
+              <a:lnRef idx="1">
+                <a:schemeClr val="accent1"/>
+              </a:lnRef>
+              <a:fillRef idx="3">
+                <a:schemeClr val="accent1"/>
+              </a:fillRef>
+              <a:effectRef idx="2">
+                <a:schemeClr val="accent1"/>
+              </a:effectRef>
+              <a:fontRef idx="minor">
+                <a:schemeClr val="lt1"/>
+              </a:fontRef>
+            </p:style>
+            <p:txBody>
+              <a:bodyPr rtlCol="0" anchor="ctr"/>
+              <a:lstStyle/>
+              <a:p>
+                <a:pPr algn="ctr"/>
+                <a:endParaRPr lang="en-US"/>
+              </a:p>
+            </p:txBody>
+          </p:sp>
+        </p:grpSp>
+        <p:sp>
+          <p:nvSpPr>
+            <p:cNvPr id="13" name="Oval 12"/>
+            <p:cNvSpPr/>
+            <p:nvPr/>
+          </p:nvSpPr>
+          <p:spPr>
+            <a:xfrm>
+              <a:off x="5955791" y="3068955"/>
+              <a:ext cx="243840" cy="243840"/>
+            </a:xfrm>
+            <a:prstGeom prst="ellipse">
+              <a:avLst/>
+            </a:prstGeom>
+            <a:solidFill>
+              <a:srgbClr val="737373"/>
+            </a:solidFill>
+            <a:ln>
+              <a:noFill/>
+            </a:ln>
+            <a:effectLst>
+              <a:outerShdw blurRad="40000" dist="23000" dir="5400000" rotWithShape="0">
+                <a:srgbClr val="141414">
+                  <a:alpha val="34902"/>
+                </a:srgbClr>
+              </a:outerShdw>
+            </a:effectLst>
+          </p:spPr>
+          <p:style>
+            <a:lnRef idx="1">
+              <a:schemeClr val="accent1"/>
+            </a:lnRef>
+            <a:fillRef idx="3">
+              <a:schemeClr val="accent1"/>
+            </a:fillRef>
+            <a:effectRef idx="2">
+              <a:schemeClr val="accent1"/>
+            </a:effectRef>
+            <a:fontRef idx="minor">
+              <a:schemeClr val="lt1"/>
+            </a:fontRef>
+          </p:style>
+          <p:txBody>
+            <a:bodyPr rtlCol="0" anchor="ctr"/>
+            <a:lstStyle/>
+            <a:p>
+              <a:pPr algn="ctr"/>
+              <a:endParaRPr lang="en-US"/>
+            </a:p>
+          </p:txBody>
+        </p:sp>
+        <p:sp>
+          <p:nvSpPr>
+            <p:cNvPr id="14" name="Oval 13"/>
+            <p:cNvSpPr/>
+            <p:nvPr/>
+          </p:nvSpPr>
+          <p:spPr>
+            <a:xfrm>
+              <a:off x="6004560" y="2633471"/>
+              <a:ext cx="243840" cy="243840"/>
+            </a:xfrm>
+            <a:prstGeom prst="ellipse">
+              <a:avLst/>
+            </a:prstGeom>
+            <a:solidFill>
+              <a:srgbClr val="737373"/>
+            </a:solidFill>
+            <a:ln>
+              <a:noFill/>
+            </a:ln>
+          </p:spPr>
+          <p:style>
+            <a:lnRef idx="1">
+              <a:schemeClr val="accent1"/>
+            </a:lnRef>
+            <a:fillRef idx="3">
+              <a:schemeClr val="accent1"/>
+            </a:fillRef>
+            <a:effectRef idx="2">
+              <a:schemeClr val="accent1"/>
+            </a:effectRef>
+            <a:fontRef idx="minor">
+              <a:schemeClr val="lt1"/>
+            </a:fontRef>
+          </p:style>
+          <p:txBody>
+            <a:bodyPr rtlCol="0" anchor="ctr"/>
+            <a:lstStyle/>
+            <a:p>
+              <a:pPr algn="ctr"/>
+              <a:endParaRPr lang="en-US"/>
+            </a:p>
+          </p:txBody>
+        </p:sp>
+      </p:grpSp>
+    </p:spTree>
+    <p:extLst>
+      <p:ext uri="{BB962C8B-B14F-4D97-AF65-F5344CB8AC3E}">
+        <p14:creationId xmlns:p14="http://schemas.microsoft.com/office/powerpoint/2010/main" val="1296906095"/>
+      </p:ext>
+    </p:extLst>
+  </p:cSld>
+  <p:clrMapOvr>
+    <a:masterClrMapping/>
+  </p:clrMapOvr>
+</p:sld>
+</file>
+
 <file path=ppt/slides/slide2.xml><?xml version="1.0" encoding="utf-8"?>
 <p:sld xmlns:a="http://schemas.openxmlformats.org/drawingml/2006/main" xmlns:r="http://schemas.openxmlformats.org/officeDocument/2006/relationships" xmlns:p="http://schemas.openxmlformats.org/presentationml/2006/main">
   <p:cSld>
@@ -5690,36 +6116,6 @@
           </a:p>
         </p:txBody>
       </p:sp>
-      <p:pic>
-        <p:nvPicPr>
-          <p:cNvPr id="5" name="Picture 4"/>
-          <p:cNvPicPr>
-            <a:picLocks noChangeAspect="1"/>
-          </p:cNvPicPr>
-          <p:nvPr/>
-        </p:nvPicPr>
-        <p:blipFill>
-          <a:blip r:embed="rId2">
-            <a:extLst>
-              <a:ext uri="{28A0092B-C50C-407E-A947-70E740481C1C}">
-                <a14:useLocalDpi xmlns:a14="http://schemas.microsoft.com/office/drawing/2010/main" val="0"/>
-              </a:ext>
-            </a:extLst>
-          </a:blip>
-          <a:stretch>
-            <a:fillRect/>
-          </a:stretch>
-        </p:blipFill>
-        <p:spPr>
-          <a:xfrm>
-            <a:off x="2814320" y="4547616"/>
-            <a:ext cx="897128" cy="897128"/>
-          </a:xfrm>
-          <a:prstGeom prst="rect">
-            <a:avLst/>
-          </a:prstGeom>
-        </p:spPr>
-      </p:pic>
       <p:sp>
         <p:nvSpPr>
           <p:cNvPr id="7" name="Trapezoid 6"/>
@@ -5940,36 +6336,81 @@
           </a:p>
         </p:txBody>
       </p:sp>
-      <p:pic>
-        <p:nvPicPr>
-          <p:cNvPr id="4" name="Picture 3"/>
-          <p:cNvPicPr>
-            <a:picLocks noChangeAspect="1"/>
-          </p:cNvPicPr>
+      <p:grpSp>
+        <p:nvGrpSpPr>
+          <p:cNvPr id="18" name="Group 17"/>
+          <p:cNvGrpSpPr/>
           <p:nvPr/>
-        </p:nvPicPr>
-        <p:blipFill>
-          <a:blip r:embed="rId3">
-            <a:extLst>
-              <a:ext uri="{28A0092B-C50C-407E-A947-70E740481C1C}">
-                <a14:useLocalDpi xmlns:a14="http://schemas.microsoft.com/office/drawing/2010/main" val="0"/>
-              </a:ext>
-            </a:extLst>
-          </a:blip>
-          <a:stretch>
-            <a:fillRect/>
-          </a:stretch>
-        </p:blipFill>
-        <p:spPr>
-          <a:xfrm rot="10800000">
-            <a:off x="3048395" y="4087061"/>
-            <a:ext cx="428978" cy="1247938"/>
+        </p:nvGrpSpPr>
+        <p:grpSpPr>
+          <a:xfrm>
+            <a:off x="2814320" y="4547616"/>
+            <a:ext cx="897128" cy="1357666"/>
+            <a:chOff x="2814320" y="4547616"/>
+            <a:chExt cx="897128" cy="1357666"/>
           </a:xfrm>
-          <a:prstGeom prst="rect">
-            <a:avLst/>
-          </a:prstGeom>
-        </p:spPr>
-      </p:pic>
+        </p:grpSpPr>
+        <p:pic>
+          <p:nvPicPr>
+            <p:cNvPr id="5" name="Picture 4"/>
+            <p:cNvPicPr>
+              <a:picLocks noChangeAspect="1"/>
+            </p:cNvPicPr>
+            <p:nvPr/>
+          </p:nvPicPr>
+          <p:blipFill>
+            <a:blip r:embed="rId2">
+              <a:extLst>
+                <a:ext uri="{28A0092B-C50C-407E-A947-70E740481C1C}">
+                  <a14:useLocalDpi xmlns:a14="http://schemas.microsoft.com/office/drawing/2010/main" val="0"/>
+                </a:ext>
+              </a:extLst>
+            </a:blip>
+            <a:stretch>
+              <a:fillRect/>
+            </a:stretch>
+          </p:blipFill>
+          <p:spPr>
+            <a:xfrm>
+              <a:off x="2814320" y="4547616"/>
+              <a:ext cx="897128" cy="897128"/>
+            </a:xfrm>
+            <a:prstGeom prst="rect">
+              <a:avLst/>
+            </a:prstGeom>
+          </p:spPr>
+        </p:pic>
+        <p:pic>
+          <p:nvPicPr>
+            <p:cNvPr id="4" name="Picture 3"/>
+            <p:cNvPicPr>
+              <a:picLocks noChangeAspect="1"/>
+            </p:cNvPicPr>
+            <p:nvPr/>
+          </p:nvPicPr>
+          <p:blipFill>
+            <a:blip r:embed="rId3">
+              <a:extLst>
+                <a:ext uri="{28A0092B-C50C-407E-A947-70E740481C1C}">
+                  <a14:useLocalDpi xmlns:a14="http://schemas.microsoft.com/office/drawing/2010/main" val="0"/>
+                </a:ext>
+              </a:extLst>
+            </a:blip>
+            <a:stretch>
+              <a:fillRect/>
+            </a:stretch>
+          </p:blipFill>
+          <p:spPr>
+            <a:xfrm>
+              <a:off x="3070931" y="4657344"/>
+              <a:ext cx="428978" cy="1247938"/>
+            </a:xfrm>
+            <a:prstGeom prst="rect">
+              <a:avLst/>
+            </a:prstGeom>
+          </p:spPr>
+        </p:pic>
+      </p:grpSp>
       <p:pic>
         <p:nvPicPr>
           <p:cNvPr id="13" name="Picture 12"/>

</xml_diff>